<commit_message>
Add image to PowerPoint slide
</commit_message>
<xml_diff>
--- a/C#/SEH Code Challenge/SEH  Code Challenge.pptx
+++ b/C#/SEH Code Challenge/SEH  Code Challenge.pptx
@@ -204,7 +204,7 @@
             </a:lvl1pPr>
           </a:lstStyle>
           <a:p>
-            <a:fld id="{5F21F51A-E50C-49FC-991D-D93383BB453F}" type="datetimeFigureOut">
+            <a:fld id="{D48841D7-71A4-4E6C-9B8E-072FD75227CF}" type="datetimeFigureOut">
               <a:rPr lang="en-US" smtClean="0"/>
               <a:t>10/16/2020</a:t>
             </a:fld>
@@ -362,7 +362,7 @@
             </a:lvl1pPr>
           </a:lstStyle>
           <a:p>
-            <a:fld id="{6DACE6AE-4990-4AB4-AEFE-4BDE2674892B}" type="slidenum">
+            <a:fld id="{1173018A-6958-47BA-AD61-41D28B200D96}" type="slidenum">
               <a:rPr lang="en-US" smtClean="0"/>
               <a:t>‹#›</a:t>
             </a:fld>
@@ -373,7 +373,7 @@
     </p:spTree>
     <p:extLst>
       <p:ext uri="{BB962C8B-B14F-4D97-AF65-F5344CB8AC3E}">
-        <p14:creationId xmlns:p14="http://schemas.microsoft.com/office/powerpoint/2010/main" val="1068118536"/>
+        <p14:creationId xmlns:p14="http://schemas.microsoft.com/office/powerpoint/2010/main" val="3273673680"/>
       </p:ext>
     </p:extLst>
   </p:cSld>
@@ -519,7 +519,7 @@
           <a:p>
             <a:r>
               <a:rPr lang="en-US"/>
-              <a:t>This demo is created by FPPT using C# - Download free templates from http://FPPT.com</a:t>
+              <a:t>Test</a:t>
             </a:r>
           </a:p>
         </p:txBody>
@@ -539,7 +539,7 @@
           <a:bodyPr/>
           <a:lstStyle/>
           <a:p>
-            <a:fld id="{6DACE6AE-4990-4AB4-AEFE-4BDE2674892B}" type="slidenum">
+            <a:fld id="{1173018A-6958-47BA-AD61-41D28B200D96}" type="slidenum">
               <a:rPr lang="en-US" smtClean="0"/>
               <a:t>1</a:t>
             </a:fld>
@@ -550,7 +550,7 @@
     </p:spTree>
     <p:extLst>
       <p:ext uri="{BB962C8B-B14F-4D97-AF65-F5344CB8AC3E}">
-        <p14:creationId xmlns:p14="http://schemas.microsoft.com/office/powerpoint/2010/main" val="2305869679"/>
+        <p14:creationId xmlns:p14="http://schemas.microsoft.com/office/powerpoint/2010/main" val="4283937197"/>
       </p:ext>
     </p:extLst>
   </p:cSld>
@@ -582,7 +582,7 @@
           <p:cNvPr id="2" name="Title 1">
             <a:extLst>
               <a:ext uri="{FF2B5EF4-FFF2-40B4-BE49-F238E27FC236}">
-                <a16:creationId xmlns:a16="http://schemas.microsoft.com/office/drawing/2014/main" id="{9AA8C295-063A-46E7-AEAA-50B7760595EF}"/>
+                <a16:creationId xmlns:a16="http://schemas.microsoft.com/office/drawing/2014/main" id="{81CB6F21-BAB1-4842-9036-36A9D43AA228}"/>
               </a:ext>
             </a:extLst>
           </p:cNvPr>
@@ -619,7 +619,7 @@
           <p:cNvPr id="3" name="Subtitle 2">
             <a:extLst>
               <a:ext uri="{FF2B5EF4-FFF2-40B4-BE49-F238E27FC236}">
-                <a16:creationId xmlns:a16="http://schemas.microsoft.com/office/drawing/2014/main" id="{3FFE3224-D0BC-41B7-A6B4-7BA7820DE1DE}"/>
+                <a16:creationId xmlns:a16="http://schemas.microsoft.com/office/drawing/2014/main" id="{1699C9CE-6142-429E-BC71-0718C913B0EC}"/>
               </a:ext>
             </a:extLst>
           </p:cNvPr>
@@ -689,7 +689,7 @@
           <p:cNvPr id="4" name="Date Placeholder 3">
             <a:extLst>
               <a:ext uri="{FF2B5EF4-FFF2-40B4-BE49-F238E27FC236}">
-                <a16:creationId xmlns:a16="http://schemas.microsoft.com/office/drawing/2014/main" id="{796F8A06-B591-4F56-9AC4-454376C90EB0}"/>
+                <a16:creationId xmlns:a16="http://schemas.microsoft.com/office/drawing/2014/main" id="{E835F898-FB64-48E2-BD0A-B697E6B76C0E}"/>
               </a:ext>
             </a:extLst>
           </p:cNvPr>
@@ -705,7 +705,7 @@
           <a:bodyPr/>
           <a:lstStyle/>
           <a:p>
-            <a:fld id="{93638018-F555-4EED-8C2C-DAC1AF9F468B}" type="datetimeFigureOut">
+            <a:fld id="{224D39E1-6AED-453D-B925-9F47B6C377E8}" type="datetimeFigureOut">
               <a:rPr lang="en-US" smtClean="0"/>
               <a:t>10/16/2020</a:t>
             </a:fld>
@@ -718,7 +718,7 @@
           <p:cNvPr id="5" name="Footer Placeholder 4">
             <a:extLst>
               <a:ext uri="{FF2B5EF4-FFF2-40B4-BE49-F238E27FC236}">
-                <a16:creationId xmlns:a16="http://schemas.microsoft.com/office/drawing/2014/main" id="{55119E65-8053-40C9-A616-4861276B86B2}"/>
+                <a16:creationId xmlns:a16="http://schemas.microsoft.com/office/drawing/2014/main" id="{C9581578-7416-4542-958B-14A7DFF9013B}"/>
               </a:ext>
             </a:extLst>
           </p:cNvPr>
@@ -743,7 +743,7 @@
           <p:cNvPr id="6" name="Slide Number Placeholder 5">
             <a:extLst>
               <a:ext uri="{FF2B5EF4-FFF2-40B4-BE49-F238E27FC236}">
-                <a16:creationId xmlns:a16="http://schemas.microsoft.com/office/drawing/2014/main" id="{9C07081D-4261-471A-BBD3-2D7FA5D1A602}"/>
+                <a16:creationId xmlns:a16="http://schemas.microsoft.com/office/drawing/2014/main" id="{EE6CEC8B-26C8-4FC2-8344-4FC4F3193BEE}"/>
               </a:ext>
             </a:extLst>
           </p:cNvPr>
@@ -759,7 +759,7 @@
           <a:bodyPr/>
           <a:lstStyle/>
           <a:p>
-            <a:fld id="{91C6F2F4-BD76-4DDF-8507-957D678B5018}" type="slidenum">
+            <a:fld id="{F3F57941-03E2-4F0C-8D13-C45F58E78EC4}" type="slidenum">
               <a:rPr lang="en-US" smtClean="0"/>
               <a:t>‹#›</a:t>
             </a:fld>
@@ -770,7 +770,7 @@
     </p:spTree>
     <p:extLst>
       <p:ext uri="{BB962C8B-B14F-4D97-AF65-F5344CB8AC3E}">
-        <p14:creationId xmlns:p14="http://schemas.microsoft.com/office/powerpoint/2010/main" val="3840609126"/>
+        <p14:creationId xmlns:p14="http://schemas.microsoft.com/office/powerpoint/2010/main" val="617569695"/>
       </p:ext>
     </p:extLst>
   </p:cSld>
@@ -802,7 +802,7 @@
           <p:cNvPr id="2" name="Title 1">
             <a:extLst>
               <a:ext uri="{FF2B5EF4-FFF2-40B4-BE49-F238E27FC236}">
-                <a16:creationId xmlns:a16="http://schemas.microsoft.com/office/drawing/2014/main" id="{BA059353-5B95-40BE-8043-5EBF7DEE2F29}"/>
+                <a16:creationId xmlns:a16="http://schemas.microsoft.com/office/drawing/2014/main" id="{678FA57C-D6BF-4907-BC9F-2723E2CAE453}"/>
               </a:ext>
             </a:extLst>
           </p:cNvPr>
@@ -830,7 +830,7 @@
           <p:cNvPr id="3" name="Vertical Text Placeholder 2">
             <a:extLst>
               <a:ext uri="{FF2B5EF4-FFF2-40B4-BE49-F238E27FC236}">
-                <a16:creationId xmlns:a16="http://schemas.microsoft.com/office/drawing/2014/main" id="{149DA5F0-CF4F-4EF1-8281-37F2EE98BD1C}"/>
+                <a16:creationId xmlns:a16="http://schemas.microsoft.com/office/drawing/2014/main" id="{E43C430F-BA08-4AB7-B4AE-557848C00AFC}"/>
               </a:ext>
             </a:extLst>
           </p:cNvPr>
@@ -887,7 +887,7 @@
           <p:cNvPr id="4" name="Date Placeholder 3">
             <a:extLst>
               <a:ext uri="{FF2B5EF4-FFF2-40B4-BE49-F238E27FC236}">
-                <a16:creationId xmlns:a16="http://schemas.microsoft.com/office/drawing/2014/main" id="{577FED62-1AAE-4EA2-9F1E-3BE7A9917B87}"/>
+                <a16:creationId xmlns:a16="http://schemas.microsoft.com/office/drawing/2014/main" id="{8C86416B-8467-4C26-A27D-59A80D673CA0}"/>
               </a:ext>
             </a:extLst>
           </p:cNvPr>
@@ -903,7 +903,7 @@
           <a:bodyPr/>
           <a:lstStyle/>
           <a:p>
-            <a:fld id="{93638018-F555-4EED-8C2C-DAC1AF9F468B}" type="datetimeFigureOut">
+            <a:fld id="{224D39E1-6AED-453D-B925-9F47B6C377E8}" type="datetimeFigureOut">
               <a:rPr lang="en-US" smtClean="0"/>
               <a:t>10/16/2020</a:t>
             </a:fld>
@@ -916,7 +916,7 @@
           <p:cNvPr id="5" name="Footer Placeholder 4">
             <a:extLst>
               <a:ext uri="{FF2B5EF4-FFF2-40B4-BE49-F238E27FC236}">
-                <a16:creationId xmlns:a16="http://schemas.microsoft.com/office/drawing/2014/main" id="{2C7ED563-9B22-4CA5-AFD4-302BD124BCC9}"/>
+                <a16:creationId xmlns:a16="http://schemas.microsoft.com/office/drawing/2014/main" id="{83390E2D-A0A9-4543-8F25-BE1FF9058CC6}"/>
               </a:ext>
             </a:extLst>
           </p:cNvPr>
@@ -941,7 +941,7 @@
           <p:cNvPr id="6" name="Slide Number Placeholder 5">
             <a:extLst>
               <a:ext uri="{FF2B5EF4-FFF2-40B4-BE49-F238E27FC236}">
-                <a16:creationId xmlns:a16="http://schemas.microsoft.com/office/drawing/2014/main" id="{12EAA40B-54EB-47DB-90C4-26A13E2C55DA}"/>
+                <a16:creationId xmlns:a16="http://schemas.microsoft.com/office/drawing/2014/main" id="{4BA6F746-8029-463E-AA65-AB627A9BE345}"/>
               </a:ext>
             </a:extLst>
           </p:cNvPr>
@@ -957,7 +957,7 @@
           <a:bodyPr/>
           <a:lstStyle/>
           <a:p>
-            <a:fld id="{91C6F2F4-BD76-4DDF-8507-957D678B5018}" type="slidenum">
+            <a:fld id="{F3F57941-03E2-4F0C-8D13-C45F58E78EC4}" type="slidenum">
               <a:rPr lang="en-US" smtClean="0"/>
               <a:t>‹#›</a:t>
             </a:fld>
@@ -968,7 +968,7 @@
     </p:spTree>
     <p:extLst>
       <p:ext uri="{BB962C8B-B14F-4D97-AF65-F5344CB8AC3E}">
-        <p14:creationId xmlns:p14="http://schemas.microsoft.com/office/powerpoint/2010/main" val="1690690374"/>
+        <p14:creationId xmlns:p14="http://schemas.microsoft.com/office/powerpoint/2010/main" val="3501894989"/>
       </p:ext>
     </p:extLst>
   </p:cSld>
@@ -1000,7 +1000,7 @@
           <p:cNvPr id="2" name="Vertical Title 1">
             <a:extLst>
               <a:ext uri="{FF2B5EF4-FFF2-40B4-BE49-F238E27FC236}">
-                <a16:creationId xmlns:a16="http://schemas.microsoft.com/office/drawing/2014/main" id="{4764F641-1E9A-41E6-BF31-18D3381EEAB8}"/>
+                <a16:creationId xmlns:a16="http://schemas.microsoft.com/office/drawing/2014/main" id="{9BE41C46-CA79-47C3-BC06-98C95FF31486}"/>
               </a:ext>
             </a:extLst>
           </p:cNvPr>
@@ -1033,7 +1033,7 @@
           <p:cNvPr id="3" name="Vertical Text Placeholder 2">
             <a:extLst>
               <a:ext uri="{FF2B5EF4-FFF2-40B4-BE49-F238E27FC236}">
-                <a16:creationId xmlns:a16="http://schemas.microsoft.com/office/drawing/2014/main" id="{E39AF00C-D8D5-4E56-B7B0-4A1A7EEEA82C}"/>
+                <a16:creationId xmlns:a16="http://schemas.microsoft.com/office/drawing/2014/main" id="{1DCEC1DF-D067-40A2-80E6-6752E90787BC}"/>
               </a:ext>
             </a:extLst>
           </p:cNvPr>
@@ -1095,7 +1095,7 @@
           <p:cNvPr id="4" name="Date Placeholder 3">
             <a:extLst>
               <a:ext uri="{FF2B5EF4-FFF2-40B4-BE49-F238E27FC236}">
-                <a16:creationId xmlns:a16="http://schemas.microsoft.com/office/drawing/2014/main" id="{758F4E8A-3FEA-4640-A8AB-108685F4F5CD}"/>
+                <a16:creationId xmlns:a16="http://schemas.microsoft.com/office/drawing/2014/main" id="{8B9948FE-D401-4908-9919-316629756BF3}"/>
               </a:ext>
             </a:extLst>
           </p:cNvPr>
@@ -1111,7 +1111,7 @@
           <a:bodyPr/>
           <a:lstStyle/>
           <a:p>
-            <a:fld id="{93638018-F555-4EED-8C2C-DAC1AF9F468B}" type="datetimeFigureOut">
+            <a:fld id="{224D39E1-6AED-453D-B925-9F47B6C377E8}" type="datetimeFigureOut">
               <a:rPr lang="en-US" smtClean="0"/>
               <a:t>10/16/2020</a:t>
             </a:fld>
@@ -1124,7 +1124,7 @@
           <p:cNvPr id="5" name="Footer Placeholder 4">
             <a:extLst>
               <a:ext uri="{FF2B5EF4-FFF2-40B4-BE49-F238E27FC236}">
-                <a16:creationId xmlns:a16="http://schemas.microsoft.com/office/drawing/2014/main" id="{615A5D20-A0E6-4DC0-89D3-43D2651AF566}"/>
+                <a16:creationId xmlns:a16="http://schemas.microsoft.com/office/drawing/2014/main" id="{DDA5D06D-431C-4234-92B9-E7E0BE33F59B}"/>
               </a:ext>
             </a:extLst>
           </p:cNvPr>
@@ -1149,7 +1149,7 @@
           <p:cNvPr id="6" name="Slide Number Placeholder 5">
             <a:extLst>
               <a:ext uri="{FF2B5EF4-FFF2-40B4-BE49-F238E27FC236}">
-                <a16:creationId xmlns:a16="http://schemas.microsoft.com/office/drawing/2014/main" id="{531D81F1-BAF5-49F1-B6E5-DBFFACE3F03C}"/>
+                <a16:creationId xmlns:a16="http://schemas.microsoft.com/office/drawing/2014/main" id="{1EF14F0E-6236-4F4D-9A1B-8717933C02C2}"/>
               </a:ext>
             </a:extLst>
           </p:cNvPr>
@@ -1165,7 +1165,7 @@
           <a:bodyPr/>
           <a:lstStyle/>
           <a:p>
-            <a:fld id="{91C6F2F4-BD76-4DDF-8507-957D678B5018}" type="slidenum">
+            <a:fld id="{F3F57941-03E2-4F0C-8D13-C45F58E78EC4}" type="slidenum">
               <a:rPr lang="en-US" smtClean="0"/>
               <a:t>‹#›</a:t>
             </a:fld>
@@ -1176,7 +1176,7 @@
     </p:spTree>
     <p:extLst>
       <p:ext uri="{BB962C8B-B14F-4D97-AF65-F5344CB8AC3E}">
-        <p14:creationId xmlns:p14="http://schemas.microsoft.com/office/powerpoint/2010/main" val="145754689"/>
+        <p14:creationId xmlns:p14="http://schemas.microsoft.com/office/powerpoint/2010/main" val="3330262787"/>
       </p:ext>
     </p:extLst>
   </p:cSld>
@@ -1208,7 +1208,7 @@
           <p:cNvPr id="2" name="Title 1">
             <a:extLst>
               <a:ext uri="{FF2B5EF4-FFF2-40B4-BE49-F238E27FC236}">
-                <a16:creationId xmlns:a16="http://schemas.microsoft.com/office/drawing/2014/main" id="{2C92C0D8-4EC4-405A-B190-FE9E57E761C1}"/>
+                <a16:creationId xmlns:a16="http://schemas.microsoft.com/office/drawing/2014/main" id="{57BFF432-B8D5-47B6-946F-3D744F9B7C93}"/>
               </a:ext>
             </a:extLst>
           </p:cNvPr>
@@ -1236,7 +1236,7 @@
           <p:cNvPr id="3" name="Content Placeholder 2">
             <a:extLst>
               <a:ext uri="{FF2B5EF4-FFF2-40B4-BE49-F238E27FC236}">
-                <a16:creationId xmlns:a16="http://schemas.microsoft.com/office/drawing/2014/main" id="{317467BB-19F3-4AF7-81DB-D8B28FC8CC2F}"/>
+                <a16:creationId xmlns:a16="http://schemas.microsoft.com/office/drawing/2014/main" id="{242A6E90-EA44-4660-8A54-86B528D54E4E}"/>
               </a:ext>
             </a:extLst>
           </p:cNvPr>
@@ -1293,7 +1293,7 @@
           <p:cNvPr id="4" name="Date Placeholder 3">
             <a:extLst>
               <a:ext uri="{FF2B5EF4-FFF2-40B4-BE49-F238E27FC236}">
-                <a16:creationId xmlns:a16="http://schemas.microsoft.com/office/drawing/2014/main" id="{373CA9CE-5FD8-4454-B5C1-7077F46DAF0F}"/>
+                <a16:creationId xmlns:a16="http://schemas.microsoft.com/office/drawing/2014/main" id="{A2B963BD-3967-4474-BB52-C4689A671E84}"/>
               </a:ext>
             </a:extLst>
           </p:cNvPr>
@@ -1309,7 +1309,7 @@
           <a:bodyPr/>
           <a:lstStyle/>
           <a:p>
-            <a:fld id="{93638018-F555-4EED-8C2C-DAC1AF9F468B}" type="datetimeFigureOut">
+            <a:fld id="{224D39E1-6AED-453D-B925-9F47B6C377E8}" type="datetimeFigureOut">
               <a:rPr lang="en-US" smtClean="0"/>
               <a:t>10/16/2020</a:t>
             </a:fld>
@@ -1322,7 +1322,7 @@
           <p:cNvPr id="5" name="Footer Placeholder 4">
             <a:extLst>
               <a:ext uri="{FF2B5EF4-FFF2-40B4-BE49-F238E27FC236}">
-                <a16:creationId xmlns:a16="http://schemas.microsoft.com/office/drawing/2014/main" id="{532B68C5-8619-4B9C-B244-8F346D2C6CE0}"/>
+                <a16:creationId xmlns:a16="http://schemas.microsoft.com/office/drawing/2014/main" id="{06B8913B-E759-46A8-A103-1422A3CB6A0A}"/>
               </a:ext>
             </a:extLst>
           </p:cNvPr>
@@ -1347,7 +1347,7 @@
           <p:cNvPr id="6" name="Slide Number Placeholder 5">
             <a:extLst>
               <a:ext uri="{FF2B5EF4-FFF2-40B4-BE49-F238E27FC236}">
-                <a16:creationId xmlns:a16="http://schemas.microsoft.com/office/drawing/2014/main" id="{07276A0C-2DF6-4E59-895A-16245E6FA6AE}"/>
+                <a16:creationId xmlns:a16="http://schemas.microsoft.com/office/drawing/2014/main" id="{94CCBC8C-0E02-494A-B68D-2474CCE8307F}"/>
               </a:ext>
             </a:extLst>
           </p:cNvPr>
@@ -1363,7 +1363,7 @@
           <a:bodyPr/>
           <a:lstStyle/>
           <a:p>
-            <a:fld id="{91C6F2F4-BD76-4DDF-8507-957D678B5018}" type="slidenum">
+            <a:fld id="{F3F57941-03E2-4F0C-8D13-C45F58E78EC4}" type="slidenum">
               <a:rPr lang="en-US" smtClean="0"/>
               <a:t>‹#›</a:t>
             </a:fld>
@@ -1374,7 +1374,7 @@
     </p:spTree>
     <p:extLst>
       <p:ext uri="{BB962C8B-B14F-4D97-AF65-F5344CB8AC3E}">
-        <p14:creationId xmlns:p14="http://schemas.microsoft.com/office/powerpoint/2010/main" val="1834390658"/>
+        <p14:creationId xmlns:p14="http://schemas.microsoft.com/office/powerpoint/2010/main" val="2239956889"/>
       </p:ext>
     </p:extLst>
   </p:cSld>
@@ -1406,7 +1406,7 @@
           <p:cNvPr id="2" name="Title 1">
             <a:extLst>
               <a:ext uri="{FF2B5EF4-FFF2-40B4-BE49-F238E27FC236}">
-                <a16:creationId xmlns:a16="http://schemas.microsoft.com/office/drawing/2014/main" id="{26242E1C-FDC7-4ADA-A4A7-2B60DBE8A8A4}"/>
+                <a16:creationId xmlns:a16="http://schemas.microsoft.com/office/drawing/2014/main" id="{8AE00F11-E3A1-4E23-9D5A-C75EAC5BF156}"/>
               </a:ext>
             </a:extLst>
           </p:cNvPr>
@@ -1443,7 +1443,7 @@
           <p:cNvPr id="3" name="Text Placeholder 2">
             <a:extLst>
               <a:ext uri="{FF2B5EF4-FFF2-40B4-BE49-F238E27FC236}">
-                <a16:creationId xmlns:a16="http://schemas.microsoft.com/office/drawing/2014/main" id="{81167A9F-C754-4A9E-83C3-749F7E16E78B}"/>
+                <a16:creationId xmlns:a16="http://schemas.microsoft.com/office/drawing/2014/main" id="{497DF4C0-3309-4240-865C-2A2E50600BDC}"/>
               </a:ext>
             </a:extLst>
           </p:cNvPr>
@@ -1568,7 +1568,7 @@
           <p:cNvPr id="4" name="Date Placeholder 3">
             <a:extLst>
               <a:ext uri="{FF2B5EF4-FFF2-40B4-BE49-F238E27FC236}">
-                <a16:creationId xmlns:a16="http://schemas.microsoft.com/office/drawing/2014/main" id="{CA6C46AF-4F98-43C8-8486-759111BAE9DA}"/>
+                <a16:creationId xmlns:a16="http://schemas.microsoft.com/office/drawing/2014/main" id="{DD099E67-8FC1-44C6-8CAB-479ECF18D8FB}"/>
               </a:ext>
             </a:extLst>
           </p:cNvPr>
@@ -1584,7 +1584,7 @@
           <a:bodyPr/>
           <a:lstStyle/>
           <a:p>
-            <a:fld id="{93638018-F555-4EED-8C2C-DAC1AF9F468B}" type="datetimeFigureOut">
+            <a:fld id="{224D39E1-6AED-453D-B925-9F47B6C377E8}" type="datetimeFigureOut">
               <a:rPr lang="en-US" smtClean="0"/>
               <a:t>10/16/2020</a:t>
             </a:fld>
@@ -1597,7 +1597,7 @@
           <p:cNvPr id="5" name="Footer Placeholder 4">
             <a:extLst>
               <a:ext uri="{FF2B5EF4-FFF2-40B4-BE49-F238E27FC236}">
-                <a16:creationId xmlns:a16="http://schemas.microsoft.com/office/drawing/2014/main" id="{B619F03A-C817-4A59-9E54-3B79BD4941E1}"/>
+                <a16:creationId xmlns:a16="http://schemas.microsoft.com/office/drawing/2014/main" id="{EC784CA5-128D-4333-ADC7-2D34C1C26D69}"/>
               </a:ext>
             </a:extLst>
           </p:cNvPr>
@@ -1622,7 +1622,7 @@
           <p:cNvPr id="6" name="Slide Number Placeholder 5">
             <a:extLst>
               <a:ext uri="{FF2B5EF4-FFF2-40B4-BE49-F238E27FC236}">
-                <a16:creationId xmlns:a16="http://schemas.microsoft.com/office/drawing/2014/main" id="{42CD811E-4731-4414-B228-4371A9437949}"/>
+                <a16:creationId xmlns:a16="http://schemas.microsoft.com/office/drawing/2014/main" id="{B0FFCA17-D188-4745-AA96-A6BDF99D06E5}"/>
               </a:ext>
             </a:extLst>
           </p:cNvPr>
@@ -1638,7 +1638,7 @@
           <a:bodyPr/>
           <a:lstStyle/>
           <a:p>
-            <a:fld id="{91C6F2F4-BD76-4DDF-8507-957D678B5018}" type="slidenum">
+            <a:fld id="{F3F57941-03E2-4F0C-8D13-C45F58E78EC4}" type="slidenum">
               <a:rPr lang="en-US" smtClean="0"/>
               <a:t>‹#›</a:t>
             </a:fld>
@@ -1649,7 +1649,7 @@
     </p:spTree>
     <p:extLst>
       <p:ext uri="{BB962C8B-B14F-4D97-AF65-F5344CB8AC3E}">
-        <p14:creationId xmlns:p14="http://schemas.microsoft.com/office/powerpoint/2010/main" val="1796616815"/>
+        <p14:creationId xmlns:p14="http://schemas.microsoft.com/office/powerpoint/2010/main" val="665221251"/>
       </p:ext>
     </p:extLst>
   </p:cSld>
@@ -1681,7 +1681,7 @@
           <p:cNvPr id="2" name="Title 1">
             <a:extLst>
               <a:ext uri="{FF2B5EF4-FFF2-40B4-BE49-F238E27FC236}">
-                <a16:creationId xmlns:a16="http://schemas.microsoft.com/office/drawing/2014/main" id="{574559B5-F24C-48F1-AA0A-3DF034D91456}"/>
+                <a16:creationId xmlns:a16="http://schemas.microsoft.com/office/drawing/2014/main" id="{A2046BCF-5F96-4022-93D1-AF01AEE8654E}"/>
               </a:ext>
             </a:extLst>
           </p:cNvPr>
@@ -1709,7 +1709,7 @@
           <p:cNvPr id="3" name="Content Placeholder 2">
             <a:extLst>
               <a:ext uri="{FF2B5EF4-FFF2-40B4-BE49-F238E27FC236}">
-                <a16:creationId xmlns:a16="http://schemas.microsoft.com/office/drawing/2014/main" id="{DA748F17-14CD-439B-9E05-AE914E5017BA}"/>
+                <a16:creationId xmlns:a16="http://schemas.microsoft.com/office/drawing/2014/main" id="{2238FFF6-723D-410D-9BEE-0AA49AF1D84D}"/>
               </a:ext>
             </a:extLst>
           </p:cNvPr>
@@ -1771,7 +1771,7 @@
           <p:cNvPr id="4" name="Content Placeholder 3">
             <a:extLst>
               <a:ext uri="{FF2B5EF4-FFF2-40B4-BE49-F238E27FC236}">
-                <a16:creationId xmlns:a16="http://schemas.microsoft.com/office/drawing/2014/main" id="{4214E71F-31FB-470A-8F31-9A05CEE9520C}"/>
+                <a16:creationId xmlns:a16="http://schemas.microsoft.com/office/drawing/2014/main" id="{2F94C895-3461-46FA-8330-25D9BB305D8C}"/>
               </a:ext>
             </a:extLst>
           </p:cNvPr>
@@ -1833,7 +1833,7 @@
           <p:cNvPr id="5" name="Date Placeholder 4">
             <a:extLst>
               <a:ext uri="{FF2B5EF4-FFF2-40B4-BE49-F238E27FC236}">
-                <a16:creationId xmlns:a16="http://schemas.microsoft.com/office/drawing/2014/main" id="{C8804C48-F8B7-4232-A3C7-6F94EF1ABED1}"/>
+                <a16:creationId xmlns:a16="http://schemas.microsoft.com/office/drawing/2014/main" id="{1A47DAB4-88C4-4650-9DBB-A1095C1D43F0}"/>
               </a:ext>
             </a:extLst>
           </p:cNvPr>
@@ -1849,7 +1849,7 @@
           <a:bodyPr/>
           <a:lstStyle/>
           <a:p>
-            <a:fld id="{93638018-F555-4EED-8C2C-DAC1AF9F468B}" type="datetimeFigureOut">
+            <a:fld id="{224D39E1-6AED-453D-B925-9F47B6C377E8}" type="datetimeFigureOut">
               <a:rPr lang="en-US" smtClean="0"/>
               <a:t>10/16/2020</a:t>
             </a:fld>
@@ -1862,7 +1862,7 @@
           <p:cNvPr id="6" name="Footer Placeholder 5">
             <a:extLst>
               <a:ext uri="{FF2B5EF4-FFF2-40B4-BE49-F238E27FC236}">
-                <a16:creationId xmlns:a16="http://schemas.microsoft.com/office/drawing/2014/main" id="{137D452D-DA3E-4BBF-8E2C-AFB545B47B04}"/>
+                <a16:creationId xmlns:a16="http://schemas.microsoft.com/office/drawing/2014/main" id="{0D43ED34-E652-489D-8035-DE0AF8ED1B4C}"/>
               </a:ext>
             </a:extLst>
           </p:cNvPr>
@@ -1887,7 +1887,7 @@
           <p:cNvPr id="7" name="Slide Number Placeholder 6">
             <a:extLst>
               <a:ext uri="{FF2B5EF4-FFF2-40B4-BE49-F238E27FC236}">
-                <a16:creationId xmlns:a16="http://schemas.microsoft.com/office/drawing/2014/main" id="{18719AC7-C020-42E8-874F-5CC5F5A0FCC2}"/>
+                <a16:creationId xmlns:a16="http://schemas.microsoft.com/office/drawing/2014/main" id="{98FA3E74-DA16-4A1F-9536-4403EC229D3A}"/>
               </a:ext>
             </a:extLst>
           </p:cNvPr>
@@ -1903,7 +1903,7 @@
           <a:bodyPr/>
           <a:lstStyle/>
           <a:p>
-            <a:fld id="{91C6F2F4-BD76-4DDF-8507-957D678B5018}" type="slidenum">
+            <a:fld id="{F3F57941-03E2-4F0C-8D13-C45F58E78EC4}" type="slidenum">
               <a:rPr lang="en-US" smtClean="0"/>
               <a:t>‹#›</a:t>
             </a:fld>
@@ -1914,7 +1914,7 @@
     </p:spTree>
     <p:extLst>
       <p:ext uri="{BB962C8B-B14F-4D97-AF65-F5344CB8AC3E}">
-        <p14:creationId xmlns:p14="http://schemas.microsoft.com/office/powerpoint/2010/main" val="3543887835"/>
+        <p14:creationId xmlns:p14="http://schemas.microsoft.com/office/powerpoint/2010/main" val="3330304042"/>
       </p:ext>
     </p:extLst>
   </p:cSld>
@@ -1946,7 +1946,7 @@
           <p:cNvPr id="2" name="Title 1">
             <a:extLst>
               <a:ext uri="{FF2B5EF4-FFF2-40B4-BE49-F238E27FC236}">
-                <a16:creationId xmlns:a16="http://schemas.microsoft.com/office/drawing/2014/main" id="{4ED31C84-8ACF-4B73-9B67-7195904572D2}"/>
+                <a16:creationId xmlns:a16="http://schemas.microsoft.com/office/drawing/2014/main" id="{EC01509A-C23D-433D-AA6B-D5D4D20D44CA}"/>
               </a:ext>
             </a:extLst>
           </p:cNvPr>
@@ -1979,7 +1979,7 @@
           <p:cNvPr id="3" name="Text Placeholder 2">
             <a:extLst>
               <a:ext uri="{FF2B5EF4-FFF2-40B4-BE49-F238E27FC236}">
-                <a16:creationId xmlns:a16="http://schemas.microsoft.com/office/drawing/2014/main" id="{3AB61B35-E607-40C8-8835-0A3D9522EA9C}"/>
+                <a16:creationId xmlns:a16="http://schemas.microsoft.com/office/drawing/2014/main" id="{8DFD2BF2-B4BB-4C87-99E2-A500D148B29B}"/>
               </a:ext>
             </a:extLst>
           </p:cNvPr>
@@ -2050,7 +2050,7 @@
           <p:cNvPr id="4" name="Content Placeholder 3">
             <a:extLst>
               <a:ext uri="{FF2B5EF4-FFF2-40B4-BE49-F238E27FC236}">
-                <a16:creationId xmlns:a16="http://schemas.microsoft.com/office/drawing/2014/main" id="{FA82920E-F22C-449A-B8BB-0F9AF8902956}"/>
+                <a16:creationId xmlns:a16="http://schemas.microsoft.com/office/drawing/2014/main" id="{5F878B96-3F08-4765-B25D-5F9FBE136478}"/>
               </a:ext>
             </a:extLst>
           </p:cNvPr>
@@ -2112,7 +2112,7 @@
           <p:cNvPr id="5" name="Text Placeholder 4">
             <a:extLst>
               <a:ext uri="{FF2B5EF4-FFF2-40B4-BE49-F238E27FC236}">
-                <a16:creationId xmlns:a16="http://schemas.microsoft.com/office/drawing/2014/main" id="{EB34263D-EEB4-4BE7-A01A-04F7D4DA4715}"/>
+                <a16:creationId xmlns:a16="http://schemas.microsoft.com/office/drawing/2014/main" id="{0475686A-B111-4618-A985-E559370B4C6C}"/>
               </a:ext>
             </a:extLst>
           </p:cNvPr>
@@ -2183,7 +2183,7 @@
           <p:cNvPr id="6" name="Content Placeholder 5">
             <a:extLst>
               <a:ext uri="{FF2B5EF4-FFF2-40B4-BE49-F238E27FC236}">
-                <a16:creationId xmlns:a16="http://schemas.microsoft.com/office/drawing/2014/main" id="{36E44ECD-B913-4A4B-9345-8D7126D02772}"/>
+                <a16:creationId xmlns:a16="http://schemas.microsoft.com/office/drawing/2014/main" id="{E6CE2776-9873-4A91-BAC3-6B35E3AC5A4C}"/>
               </a:ext>
             </a:extLst>
           </p:cNvPr>
@@ -2245,7 +2245,7 @@
           <p:cNvPr id="7" name="Date Placeholder 6">
             <a:extLst>
               <a:ext uri="{FF2B5EF4-FFF2-40B4-BE49-F238E27FC236}">
-                <a16:creationId xmlns:a16="http://schemas.microsoft.com/office/drawing/2014/main" id="{DAEFE4E7-77FA-41A8-84F3-B77E1F401C28}"/>
+                <a16:creationId xmlns:a16="http://schemas.microsoft.com/office/drawing/2014/main" id="{0CC61031-1916-43AD-AA62-1FDB6091E5E6}"/>
               </a:ext>
             </a:extLst>
           </p:cNvPr>
@@ -2261,7 +2261,7 @@
           <a:bodyPr/>
           <a:lstStyle/>
           <a:p>
-            <a:fld id="{93638018-F555-4EED-8C2C-DAC1AF9F468B}" type="datetimeFigureOut">
+            <a:fld id="{224D39E1-6AED-453D-B925-9F47B6C377E8}" type="datetimeFigureOut">
               <a:rPr lang="en-US" smtClean="0"/>
               <a:t>10/16/2020</a:t>
             </a:fld>
@@ -2274,7 +2274,7 @@
           <p:cNvPr id="8" name="Footer Placeholder 7">
             <a:extLst>
               <a:ext uri="{FF2B5EF4-FFF2-40B4-BE49-F238E27FC236}">
-                <a16:creationId xmlns:a16="http://schemas.microsoft.com/office/drawing/2014/main" id="{2B79B4FE-D810-4383-8E5A-FF99A1C87B41}"/>
+                <a16:creationId xmlns:a16="http://schemas.microsoft.com/office/drawing/2014/main" id="{6C0F7A6D-D952-4593-B1D1-0B34346FF303}"/>
               </a:ext>
             </a:extLst>
           </p:cNvPr>
@@ -2299,7 +2299,7 @@
           <p:cNvPr id="9" name="Slide Number Placeholder 8">
             <a:extLst>
               <a:ext uri="{FF2B5EF4-FFF2-40B4-BE49-F238E27FC236}">
-                <a16:creationId xmlns:a16="http://schemas.microsoft.com/office/drawing/2014/main" id="{7A04CA8C-5729-4255-BD90-528E06D017F9}"/>
+                <a16:creationId xmlns:a16="http://schemas.microsoft.com/office/drawing/2014/main" id="{ABA7A600-FE82-44C8-8F7C-E31CCAF0E4DE}"/>
               </a:ext>
             </a:extLst>
           </p:cNvPr>
@@ -2315,7 +2315,7 @@
           <a:bodyPr/>
           <a:lstStyle/>
           <a:p>
-            <a:fld id="{91C6F2F4-BD76-4DDF-8507-957D678B5018}" type="slidenum">
+            <a:fld id="{F3F57941-03E2-4F0C-8D13-C45F58E78EC4}" type="slidenum">
               <a:rPr lang="en-US" smtClean="0"/>
               <a:t>‹#›</a:t>
             </a:fld>
@@ -2326,7 +2326,7 @@
     </p:spTree>
     <p:extLst>
       <p:ext uri="{BB962C8B-B14F-4D97-AF65-F5344CB8AC3E}">
-        <p14:creationId xmlns:p14="http://schemas.microsoft.com/office/powerpoint/2010/main" val="1199939531"/>
+        <p14:creationId xmlns:p14="http://schemas.microsoft.com/office/powerpoint/2010/main" val="3811264268"/>
       </p:ext>
     </p:extLst>
   </p:cSld>
@@ -2358,7 +2358,7 @@
           <p:cNvPr id="2" name="Title 1">
             <a:extLst>
               <a:ext uri="{FF2B5EF4-FFF2-40B4-BE49-F238E27FC236}">
-                <a16:creationId xmlns:a16="http://schemas.microsoft.com/office/drawing/2014/main" id="{924A0361-9F72-4D6E-B256-4C154CF6E299}"/>
+                <a16:creationId xmlns:a16="http://schemas.microsoft.com/office/drawing/2014/main" id="{DE808A62-EB10-4AFF-94E1-4F276478A64E}"/>
               </a:ext>
             </a:extLst>
           </p:cNvPr>
@@ -2386,7 +2386,7 @@
           <p:cNvPr id="3" name="Date Placeholder 2">
             <a:extLst>
               <a:ext uri="{FF2B5EF4-FFF2-40B4-BE49-F238E27FC236}">
-                <a16:creationId xmlns:a16="http://schemas.microsoft.com/office/drawing/2014/main" id="{967F7144-4108-4661-9AF2-B971D6E92467}"/>
+                <a16:creationId xmlns:a16="http://schemas.microsoft.com/office/drawing/2014/main" id="{1DBD298A-78FC-4F16-9818-432A81A7489B}"/>
               </a:ext>
             </a:extLst>
           </p:cNvPr>
@@ -2402,7 +2402,7 @@
           <a:bodyPr/>
           <a:lstStyle/>
           <a:p>
-            <a:fld id="{93638018-F555-4EED-8C2C-DAC1AF9F468B}" type="datetimeFigureOut">
+            <a:fld id="{224D39E1-6AED-453D-B925-9F47B6C377E8}" type="datetimeFigureOut">
               <a:rPr lang="en-US" smtClean="0"/>
               <a:t>10/16/2020</a:t>
             </a:fld>
@@ -2415,7 +2415,7 @@
           <p:cNvPr id="4" name="Footer Placeholder 3">
             <a:extLst>
               <a:ext uri="{FF2B5EF4-FFF2-40B4-BE49-F238E27FC236}">
-                <a16:creationId xmlns:a16="http://schemas.microsoft.com/office/drawing/2014/main" id="{FA41412D-D26C-4BA8-B676-4CC9487935AB}"/>
+                <a16:creationId xmlns:a16="http://schemas.microsoft.com/office/drawing/2014/main" id="{45DB4653-FFF6-4741-8BB1-399D280B282D}"/>
               </a:ext>
             </a:extLst>
           </p:cNvPr>
@@ -2440,7 +2440,7 @@
           <p:cNvPr id="5" name="Slide Number Placeholder 4">
             <a:extLst>
               <a:ext uri="{FF2B5EF4-FFF2-40B4-BE49-F238E27FC236}">
-                <a16:creationId xmlns:a16="http://schemas.microsoft.com/office/drawing/2014/main" id="{361B5E22-5AA0-4284-8B26-B0E5F46242AC}"/>
+                <a16:creationId xmlns:a16="http://schemas.microsoft.com/office/drawing/2014/main" id="{3DB40CC1-62CB-4F23-B17C-7FD89499F6FB}"/>
               </a:ext>
             </a:extLst>
           </p:cNvPr>
@@ -2456,7 +2456,7 @@
           <a:bodyPr/>
           <a:lstStyle/>
           <a:p>
-            <a:fld id="{91C6F2F4-BD76-4DDF-8507-957D678B5018}" type="slidenum">
+            <a:fld id="{F3F57941-03E2-4F0C-8D13-C45F58E78EC4}" type="slidenum">
               <a:rPr lang="en-US" smtClean="0"/>
               <a:t>‹#›</a:t>
             </a:fld>
@@ -2467,7 +2467,7 @@
     </p:spTree>
     <p:extLst>
       <p:ext uri="{BB962C8B-B14F-4D97-AF65-F5344CB8AC3E}">
-        <p14:creationId xmlns:p14="http://schemas.microsoft.com/office/powerpoint/2010/main" val="2563381435"/>
+        <p14:creationId xmlns:p14="http://schemas.microsoft.com/office/powerpoint/2010/main" val="589709494"/>
       </p:ext>
     </p:extLst>
   </p:cSld>
@@ -2499,7 +2499,7 @@
           <p:cNvPr id="2" name="Date Placeholder 1">
             <a:extLst>
               <a:ext uri="{FF2B5EF4-FFF2-40B4-BE49-F238E27FC236}">
-                <a16:creationId xmlns:a16="http://schemas.microsoft.com/office/drawing/2014/main" id="{AF40A799-469B-4E61-AA8F-F1F35C500A2F}"/>
+                <a16:creationId xmlns:a16="http://schemas.microsoft.com/office/drawing/2014/main" id="{D681586C-67FB-4D9D-8323-781B2A578B10}"/>
               </a:ext>
             </a:extLst>
           </p:cNvPr>
@@ -2515,7 +2515,7 @@
           <a:bodyPr/>
           <a:lstStyle/>
           <a:p>
-            <a:fld id="{93638018-F555-4EED-8C2C-DAC1AF9F468B}" type="datetimeFigureOut">
+            <a:fld id="{224D39E1-6AED-453D-B925-9F47B6C377E8}" type="datetimeFigureOut">
               <a:rPr lang="en-US" smtClean="0"/>
               <a:t>10/16/2020</a:t>
             </a:fld>
@@ -2528,7 +2528,7 @@
           <p:cNvPr id="3" name="Footer Placeholder 2">
             <a:extLst>
               <a:ext uri="{FF2B5EF4-FFF2-40B4-BE49-F238E27FC236}">
-                <a16:creationId xmlns:a16="http://schemas.microsoft.com/office/drawing/2014/main" id="{55333654-7AC0-4B97-BE36-F1EFB2D7A706}"/>
+                <a16:creationId xmlns:a16="http://schemas.microsoft.com/office/drawing/2014/main" id="{FF42416E-32CE-464C-8935-B52987FD9DDA}"/>
               </a:ext>
             </a:extLst>
           </p:cNvPr>
@@ -2553,7 +2553,7 @@
           <p:cNvPr id="4" name="Slide Number Placeholder 3">
             <a:extLst>
               <a:ext uri="{FF2B5EF4-FFF2-40B4-BE49-F238E27FC236}">
-                <a16:creationId xmlns:a16="http://schemas.microsoft.com/office/drawing/2014/main" id="{EB498309-670A-4DDD-BBD2-0E2817FE3A49}"/>
+                <a16:creationId xmlns:a16="http://schemas.microsoft.com/office/drawing/2014/main" id="{BB15D908-446A-44AD-B9E2-D108E04F5F86}"/>
               </a:ext>
             </a:extLst>
           </p:cNvPr>
@@ -2569,7 +2569,7 @@
           <a:bodyPr/>
           <a:lstStyle/>
           <a:p>
-            <a:fld id="{91C6F2F4-BD76-4DDF-8507-957D678B5018}" type="slidenum">
+            <a:fld id="{F3F57941-03E2-4F0C-8D13-C45F58E78EC4}" type="slidenum">
               <a:rPr lang="en-US" smtClean="0"/>
               <a:t>‹#›</a:t>
             </a:fld>
@@ -2580,7 +2580,7 @@
     </p:spTree>
     <p:extLst>
       <p:ext uri="{BB962C8B-B14F-4D97-AF65-F5344CB8AC3E}">
-        <p14:creationId xmlns:p14="http://schemas.microsoft.com/office/powerpoint/2010/main" val="3277621379"/>
+        <p14:creationId xmlns:p14="http://schemas.microsoft.com/office/powerpoint/2010/main" val="3542696080"/>
       </p:ext>
     </p:extLst>
   </p:cSld>
@@ -2612,7 +2612,7 @@
           <p:cNvPr id="2" name="Title 1">
             <a:extLst>
               <a:ext uri="{FF2B5EF4-FFF2-40B4-BE49-F238E27FC236}">
-                <a16:creationId xmlns:a16="http://schemas.microsoft.com/office/drawing/2014/main" id="{667C8BE7-828A-4AC5-AA35-AD28DA69B8E5}"/>
+                <a16:creationId xmlns:a16="http://schemas.microsoft.com/office/drawing/2014/main" id="{13835D93-E493-4653-9009-90CC2767433E}"/>
               </a:ext>
             </a:extLst>
           </p:cNvPr>
@@ -2649,7 +2649,7 @@
           <p:cNvPr id="3" name="Content Placeholder 2">
             <a:extLst>
               <a:ext uri="{FF2B5EF4-FFF2-40B4-BE49-F238E27FC236}">
-                <a16:creationId xmlns:a16="http://schemas.microsoft.com/office/drawing/2014/main" id="{D3DB66A1-C4B0-49B6-8919-48A361FFA8C2}"/>
+                <a16:creationId xmlns:a16="http://schemas.microsoft.com/office/drawing/2014/main" id="{4B373177-7D23-4C2D-84FA-40CA558CA0BB}"/>
               </a:ext>
             </a:extLst>
           </p:cNvPr>
@@ -2739,7 +2739,7 @@
           <p:cNvPr id="4" name="Text Placeholder 3">
             <a:extLst>
               <a:ext uri="{FF2B5EF4-FFF2-40B4-BE49-F238E27FC236}">
-                <a16:creationId xmlns:a16="http://schemas.microsoft.com/office/drawing/2014/main" id="{DF0DED63-FD25-4A96-9806-146A3BA4D8EB}"/>
+                <a16:creationId xmlns:a16="http://schemas.microsoft.com/office/drawing/2014/main" id="{3D3FB8A0-6428-4055-B756-1B3F5E140465}"/>
               </a:ext>
             </a:extLst>
           </p:cNvPr>
@@ -2810,7 +2810,7 @@
           <p:cNvPr id="5" name="Date Placeholder 4">
             <a:extLst>
               <a:ext uri="{FF2B5EF4-FFF2-40B4-BE49-F238E27FC236}">
-                <a16:creationId xmlns:a16="http://schemas.microsoft.com/office/drawing/2014/main" id="{A8848407-76C0-4889-A945-DA2091CB37C5}"/>
+                <a16:creationId xmlns:a16="http://schemas.microsoft.com/office/drawing/2014/main" id="{44EE28F0-03C4-4DE7-A41B-070FC005A2FD}"/>
               </a:ext>
             </a:extLst>
           </p:cNvPr>
@@ -2826,7 +2826,7 @@
           <a:bodyPr/>
           <a:lstStyle/>
           <a:p>
-            <a:fld id="{93638018-F555-4EED-8C2C-DAC1AF9F468B}" type="datetimeFigureOut">
+            <a:fld id="{224D39E1-6AED-453D-B925-9F47B6C377E8}" type="datetimeFigureOut">
               <a:rPr lang="en-US" smtClean="0"/>
               <a:t>10/16/2020</a:t>
             </a:fld>
@@ -2839,7 +2839,7 @@
           <p:cNvPr id="6" name="Footer Placeholder 5">
             <a:extLst>
               <a:ext uri="{FF2B5EF4-FFF2-40B4-BE49-F238E27FC236}">
-                <a16:creationId xmlns:a16="http://schemas.microsoft.com/office/drawing/2014/main" id="{CD61EFA0-3D1F-4E41-9BD0-3F0DD0BAC5DA}"/>
+                <a16:creationId xmlns:a16="http://schemas.microsoft.com/office/drawing/2014/main" id="{AAB966F0-9312-422F-892B-EEB8154E5E60}"/>
               </a:ext>
             </a:extLst>
           </p:cNvPr>
@@ -2864,7 +2864,7 @@
           <p:cNvPr id="7" name="Slide Number Placeholder 6">
             <a:extLst>
               <a:ext uri="{FF2B5EF4-FFF2-40B4-BE49-F238E27FC236}">
-                <a16:creationId xmlns:a16="http://schemas.microsoft.com/office/drawing/2014/main" id="{11527788-229F-4EC7-A813-997D5BA691A8}"/>
+                <a16:creationId xmlns:a16="http://schemas.microsoft.com/office/drawing/2014/main" id="{DA12F360-4A83-4985-896C-C7CB528DF4F0}"/>
               </a:ext>
             </a:extLst>
           </p:cNvPr>
@@ -2880,7 +2880,7 @@
           <a:bodyPr/>
           <a:lstStyle/>
           <a:p>
-            <a:fld id="{91C6F2F4-BD76-4DDF-8507-957D678B5018}" type="slidenum">
+            <a:fld id="{F3F57941-03E2-4F0C-8D13-C45F58E78EC4}" type="slidenum">
               <a:rPr lang="en-US" smtClean="0"/>
               <a:t>‹#›</a:t>
             </a:fld>
@@ -2891,7 +2891,7 @@
     </p:spTree>
     <p:extLst>
       <p:ext uri="{BB962C8B-B14F-4D97-AF65-F5344CB8AC3E}">
-        <p14:creationId xmlns:p14="http://schemas.microsoft.com/office/powerpoint/2010/main" val="367216238"/>
+        <p14:creationId xmlns:p14="http://schemas.microsoft.com/office/powerpoint/2010/main" val="28945673"/>
       </p:ext>
     </p:extLst>
   </p:cSld>
@@ -2923,7 +2923,7 @@
           <p:cNvPr id="2" name="Title 1">
             <a:extLst>
               <a:ext uri="{FF2B5EF4-FFF2-40B4-BE49-F238E27FC236}">
-                <a16:creationId xmlns:a16="http://schemas.microsoft.com/office/drawing/2014/main" id="{28D15F35-00FC-4A3B-A651-F9E540B49EE6}"/>
+                <a16:creationId xmlns:a16="http://schemas.microsoft.com/office/drawing/2014/main" id="{472804EF-155D-4D9E-8F94-6A49FBF62D93}"/>
               </a:ext>
             </a:extLst>
           </p:cNvPr>
@@ -2960,7 +2960,7 @@
           <p:cNvPr id="3" name="Picture Placeholder 2">
             <a:extLst>
               <a:ext uri="{FF2B5EF4-FFF2-40B4-BE49-F238E27FC236}">
-                <a16:creationId xmlns:a16="http://schemas.microsoft.com/office/drawing/2014/main" id="{C342379F-9F33-4877-9AEE-EE779FFE1779}"/>
+                <a16:creationId xmlns:a16="http://schemas.microsoft.com/office/drawing/2014/main" id="{CDD6AC7B-251F-4690-B2A5-FA9A32C92703}"/>
               </a:ext>
             </a:extLst>
           </p:cNvPr>
@@ -3027,7 +3027,7 @@
           <p:cNvPr id="4" name="Text Placeholder 3">
             <a:extLst>
               <a:ext uri="{FF2B5EF4-FFF2-40B4-BE49-F238E27FC236}">
-                <a16:creationId xmlns:a16="http://schemas.microsoft.com/office/drawing/2014/main" id="{112770CE-61EE-479D-B513-43D3387EA30F}"/>
+                <a16:creationId xmlns:a16="http://schemas.microsoft.com/office/drawing/2014/main" id="{E76B3C55-1AF0-47F2-9B9E-6ECEC27185A7}"/>
               </a:ext>
             </a:extLst>
           </p:cNvPr>
@@ -3098,7 +3098,7 @@
           <p:cNvPr id="5" name="Date Placeholder 4">
             <a:extLst>
               <a:ext uri="{FF2B5EF4-FFF2-40B4-BE49-F238E27FC236}">
-                <a16:creationId xmlns:a16="http://schemas.microsoft.com/office/drawing/2014/main" id="{D071445D-798D-489B-B16C-87AA0C113EFC}"/>
+                <a16:creationId xmlns:a16="http://schemas.microsoft.com/office/drawing/2014/main" id="{02F3F9A0-0034-4FA4-A773-3A330FC6F02D}"/>
               </a:ext>
             </a:extLst>
           </p:cNvPr>
@@ -3114,7 +3114,7 @@
           <a:bodyPr/>
           <a:lstStyle/>
           <a:p>
-            <a:fld id="{93638018-F555-4EED-8C2C-DAC1AF9F468B}" type="datetimeFigureOut">
+            <a:fld id="{224D39E1-6AED-453D-B925-9F47B6C377E8}" type="datetimeFigureOut">
               <a:rPr lang="en-US" smtClean="0"/>
               <a:t>10/16/2020</a:t>
             </a:fld>
@@ -3127,7 +3127,7 @@
           <p:cNvPr id="6" name="Footer Placeholder 5">
             <a:extLst>
               <a:ext uri="{FF2B5EF4-FFF2-40B4-BE49-F238E27FC236}">
-                <a16:creationId xmlns:a16="http://schemas.microsoft.com/office/drawing/2014/main" id="{A8DE37DD-3A2D-4D44-8728-5F480AE450C5}"/>
+                <a16:creationId xmlns:a16="http://schemas.microsoft.com/office/drawing/2014/main" id="{571450C8-A0CC-4B00-9296-C087F9A619D8}"/>
               </a:ext>
             </a:extLst>
           </p:cNvPr>
@@ -3152,7 +3152,7 @@
           <p:cNvPr id="7" name="Slide Number Placeholder 6">
             <a:extLst>
               <a:ext uri="{FF2B5EF4-FFF2-40B4-BE49-F238E27FC236}">
-                <a16:creationId xmlns:a16="http://schemas.microsoft.com/office/drawing/2014/main" id="{F7219C97-129C-4CA6-9EE1-DD96B0F4066B}"/>
+                <a16:creationId xmlns:a16="http://schemas.microsoft.com/office/drawing/2014/main" id="{01F87954-1CD2-480C-82ED-A9D46FE50DB9}"/>
               </a:ext>
             </a:extLst>
           </p:cNvPr>
@@ -3168,7 +3168,7 @@
           <a:bodyPr/>
           <a:lstStyle/>
           <a:p>
-            <a:fld id="{91C6F2F4-BD76-4DDF-8507-957D678B5018}" type="slidenum">
+            <a:fld id="{F3F57941-03E2-4F0C-8D13-C45F58E78EC4}" type="slidenum">
               <a:rPr lang="en-US" smtClean="0"/>
               <a:t>‹#›</a:t>
             </a:fld>
@@ -3179,7 +3179,7 @@
     </p:spTree>
     <p:extLst>
       <p:ext uri="{BB962C8B-B14F-4D97-AF65-F5344CB8AC3E}">
-        <p14:creationId xmlns:p14="http://schemas.microsoft.com/office/powerpoint/2010/main" val="2402965425"/>
+        <p14:creationId xmlns:p14="http://schemas.microsoft.com/office/powerpoint/2010/main" val="3395184121"/>
       </p:ext>
     </p:extLst>
   </p:cSld>
@@ -3216,7 +3216,7 @@
           <p:cNvPr id="2" name="Title Placeholder 1">
             <a:extLst>
               <a:ext uri="{FF2B5EF4-FFF2-40B4-BE49-F238E27FC236}">
-                <a16:creationId xmlns:a16="http://schemas.microsoft.com/office/drawing/2014/main" id="{9D51D59D-7952-46DC-968D-8FCDAF1460FC}"/>
+                <a16:creationId xmlns:a16="http://schemas.microsoft.com/office/drawing/2014/main" id="{492869DC-1A00-4203-8555-5479315BD00A}"/>
               </a:ext>
             </a:extLst>
           </p:cNvPr>
@@ -3254,7 +3254,7 @@
           <p:cNvPr id="3" name="Text Placeholder 2">
             <a:extLst>
               <a:ext uri="{FF2B5EF4-FFF2-40B4-BE49-F238E27FC236}">
-                <a16:creationId xmlns:a16="http://schemas.microsoft.com/office/drawing/2014/main" id="{FED8B1C5-2775-41C4-9AF3-D8DCEE6D918B}"/>
+                <a16:creationId xmlns:a16="http://schemas.microsoft.com/office/drawing/2014/main" id="{D943A31F-EFAB-4B51-9511-05E0B7EAE6B2}"/>
               </a:ext>
             </a:extLst>
           </p:cNvPr>
@@ -3321,7 +3321,7 @@
           <p:cNvPr id="4" name="Date Placeholder 3">
             <a:extLst>
               <a:ext uri="{FF2B5EF4-FFF2-40B4-BE49-F238E27FC236}">
-                <a16:creationId xmlns:a16="http://schemas.microsoft.com/office/drawing/2014/main" id="{C086B333-F02B-4AD1-A5E3-321ABA8D7E93}"/>
+                <a16:creationId xmlns:a16="http://schemas.microsoft.com/office/drawing/2014/main" id="{B8E2C495-A158-414E-91BA-35E9165DB351}"/>
               </a:ext>
             </a:extLst>
           </p:cNvPr>
@@ -3355,7 +3355,7 @@
             </a:lvl1pPr>
           </a:lstStyle>
           <a:p>
-            <a:fld id="{93638018-F555-4EED-8C2C-DAC1AF9F468B}" type="datetimeFigureOut">
+            <a:fld id="{224D39E1-6AED-453D-B925-9F47B6C377E8}" type="datetimeFigureOut">
               <a:rPr lang="en-US" smtClean="0"/>
               <a:t>10/16/2020</a:t>
             </a:fld>
@@ -3368,7 +3368,7 @@
           <p:cNvPr id="5" name="Footer Placeholder 4">
             <a:extLst>
               <a:ext uri="{FF2B5EF4-FFF2-40B4-BE49-F238E27FC236}">
-                <a16:creationId xmlns:a16="http://schemas.microsoft.com/office/drawing/2014/main" id="{C4755F46-4E4F-454B-BAC2-8E8BA84D5BA9}"/>
+                <a16:creationId xmlns:a16="http://schemas.microsoft.com/office/drawing/2014/main" id="{095C7998-C670-4BC3-9436-773AE7C3EB80}"/>
               </a:ext>
             </a:extLst>
           </p:cNvPr>
@@ -3411,7 +3411,7 @@
           <p:cNvPr id="6" name="Slide Number Placeholder 5">
             <a:extLst>
               <a:ext uri="{FF2B5EF4-FFF2-40B4-BE49-F238E27FC236}">
-                <a16:creationId xmlns:a16="http://schemas.microsoft.com/office/drawing/2014/main" id="{E6975C99-6E23-490C-B195-271B82A1F0CC}"/>
+                <a16:creationId xmlns:a16="http://schemas.microsoft.com/office/drawing/2014/main" id="{CFA1D24A-DC6D-433B-A82B-9EDDE9BA3026}"/>
               </a:ext>
             </a:extLst>
           </p:cNvPr>
@@ -3445,7 +3445,7 @@
             </a:lvl1pPr>
           </a:lstStyle>
           <a:p>
-            <a:fld id="{91C6F2F4-BD76-4DDF-8507-957D678B5018}" type="slidenum">
+            <a:fld id="{F3F57941-03E2-4F0C-8D13-C45F58E78EC4}" type="slidenum">
               <a:rPr lang="en-US" smtClean="0"/>
               <a:t>‹#›</a:t>
             </a:fld>
@@ -3456,7 +3456,7 @@
     </p:spTree>
     <p:extLst>
       <p:ext uri="{BB962C8B-B14F-4D97-AF65-F5344CB8AC3E}">
-        <p14:creationId xmlns:p14="http://schemas.microsoft.com/office/powerpoint/2010/main" val="1983712369"/>
+        <p14:creationId xmlns:p14="http://schemas.microsoft.com/office/powerpoint/2010/main" val="2661052302"/>
       </p:ext>
     </p:extLst>
   </p:cSld>
@@ -3779,7 +3779,7 @@
           <p:cNvPr id="2" name="Title 1">
             <a:extLst>
               <a:ext uri="{FF2B5EF4-FFF2-40B4-BE49-F238E27FC236}">
-                <a16:creationId xmlns:a16="http://schemas.microsoft.com/office/drawing/2014/main" id="{E87D3520-EE54-4B94-A660-7C9CD169D531}"/>
+                <a16:creationId xmlns:a16="http://schemas.microsoft.com/office/drawing/2014/main" id="{D174F5B1-6FD3-4C2D-8811-2B7B9FD9348D}"/>
               </a:ext>
             </a:extLst>
           </p:cNvPr>
@@ -3811,7 +3811,7 @@
           <p:cNvPr id="3" name="Content Placeholder 2">
             <a:extLst>
               <a:ext uri="{FF2B5EF4-FFF2-40B4-BE49-F238E27FC236}">
-                <a16:creationId xmlns:a16="http://schemas.microsoft.com/office/drawing/2014/main" id="{2E6A64A1-AC52-4C30-AF20-0EDF35AE918D}"/>
+                <a16:creationId xmlns:a16="http://schemas.microsoft.com/office/drawing/2014/main" id="{C4E0F83F-0D68-4225-B35F-A87DFCF73150}"/>
               </a:ext>
             </a:extLst>
           </p:cNvPr>
@@ -3834,10 +3834,46 @@
           </a:p>
         </p:txBody>
       </p:sp>
+      <p:pic>
+        <p:nvPicPr>
+          <p:cNvPr id="5" name="Picture 4">
+            <a:extLst>
+              <a:ext uri="{FF2B5EF4-FFF2-40B4-BE49-F238E27FC236}">
+                <a16:creationId xmlns:a16="http://schemas.microsoft.com/office/drawing/2014/main" id="{DEF1E869-5AC9-43EC-BCEB-6A60D3893C31}"/>
+              </a:ext>
+            </a:extLst>
+          </p:cNvPr>
+          <p:cNvPicPr>
+            <a:picLocks/>
+          </p:cNvPicPr>
+          <p:nvPr/>
+        </p:nvPicPr>
+        <p:blipFill>
+          <a:blip r:embed="rId3">
+            <a:extLst>
+              <a:ext uri="{28A0092B-C50C-407E-A947-70E740481C1C}">
+                <a14:useLocalDpi xmlns:a14="http://schemas.microsoft.com/office/drawing/2010/main" val="0"/>
+              </a:ext>
+            </a:extLst>
+          </a:blip>
+          <a:stretch>
+            <a:fillRect/>
+          </a:stretch>
+        </p:blipFill>
+        <p:spPr>
+          <a:xfrm>
+            <a:off x="838200" y="1825625"/>
+            <a:ext cx="10515600" cy="4351338"/>
+          </a:xfrm>
+          <a:prstGeom prst="rect">
+            <a:avLst/>
+          </a:prstGeom>
+        </p:spPr>
+      </p:pic>
     </p:spTree>
     <p:extLst>
       <p:ext uri="{BB962C8B-B14F-4D97-AF65-F5344CB8AC3E}">
-        <p14:creationId xmlns:p14="http://schemas.microsoft.com/office/powerpoint/2010/main" val="4054736248"/>
+        <p14:creationId xmlns:p14="http://schemas.microsoft.com/office/powerpoint/2010/main" val="710152848"/>
       </p:ext>
     </p:extLst>
   </p:cSld>

</xml_diff>

<commit_message>
Switch to Syncfusion for PPT
</commit_message>
<xml_diff>
--- a/C#/SEH Code Challenge/SEH  Code Challenge.pptx
+++ b/C#/SEH Code Challenge/SEH  Code Challenge.pptx
@@ -204,7 +204,7 @@
             </a:lvl1pPr>
           </a:lstStyle>
           <a:p>
-            <a:fld id="{D48841D7-71A4-4E6C-9B8E-072FD75227CF}" type="datetimeFigureOut">
+            <a:fld id="{25999101-D835-45E5-90E6-D5420AC34F40}" type="datetimeFigureOut">
               <a:rPr lang="en-US" smtClean="0"/>
               <a:t>10/16/2020</a:t>
             </a:fld>
@@ -362,7 +362,7 @@
             </a:lvl1pPr>
           </a:lstStyle>
           <a:p>
-            <a:fld id="{1173018A-6958-47BA-AD61-41D28B200D96}" type="slidenum">
+            <a:fld id="{9CF5AADE-1546-4FD6-BCFF-8F15459E8B55}" type="slidenum">
               <a:rPr lang="en-US" smtClean="0"/>
               <a:t>‹#›</a:t>
             </a:fld>
@@ -373,7 +373,7 @@
     </p:spTree>
     <p:extLst>
       <p:ext uri="{BB962C8B-B14F-4D97-AF65-F5344CB8AC3E}">
-        <p14:creationId xmlns:p14="http://schemas.microsoft.com/office/powerpoint/2010/main" val="3273673680"/>
+        <p14:creationId xmlns:p14="http://schemas.microsoft.com/office/powerpoint/2010/main" val="3725597080"/>
       </p:ext>
     </p:extLst>
   </p:cSld>
@@ -539,7 +539,7 @@
           <a:bodyPr/>
           <a:lstStyle/>
           <a:p>
-            <a:fld id="{1173018A-6958-47BA-AD61-41D28B200D96}" type="slidenum">
+            <a:fld id="{9CF5AADE-1546-4FD6-BCFF-8F15459E8B55}" type="slidenum">
               <a:rPr lang="en-US" smtClean="0"/>
               <a:t>1</a:t>
             </a:fld>
@@ -550,7 +550,7 @@
     </p:spTree>
     <p:extLst>
       <p:ext uri="{BB962C8B-B14F-4D97-AF65-F5344CB8AC3E}">
-        <p14:creationId xmlns:p14="http://schemas.microsoft.com/office/powerpoint/2010/main" val="4283937197"/>
+        <p14:creationId xmlns:p14="http://schemas.microsoft.com/office/powerpoint/2010/main" val="1630837496"/>
       </p:ext>
     </p:extLst>
   </p:cSld>
@@ -582,7 +582,7 @@
           <p:cNvPr id="2" name="Title 1">
             <a:extLst>
               <a:ext uri="{FF2B5EF4-FFF2-40B4-BE49-F238E27FC236}">
-                <a16:creationId xmlns:a16="http://schemas.microsoft.com/office/drawing/2014/main" id="{81CB6F21-BAB1-4842-9036-36A9D43AA228}"/>
+                <a16:creationId xmlns:a16="http://schemas.microsoft.com/office/drawing/2014/main" id="{7AF34348-F4C5-4AE0-8A49-B7CF46608CCC}"/>
               </a:ext>
             </a:extLst>
           </p:cNvPr>
@@ -619,7 +619,7 @@
           <p:cNvPr id="3" name="Subtitle 2">
             <a:extLst>
               <a:ext uri="{FF2B5EF4-FFF2-40B4-BE49-F238E27FC236}">
-                <a16:creationId xmlns:a16="http://schemas.microsoft.com/office/drawing/2014/main" id="{1699C9CE-6142-429E-BC71-0718C913B0EC}"/>
+                <a16:creationId xmlns:a16="http://schemas.microsoft.com/office/drawing/2014/main" id="{430A4391-9578-44C8-81A6-49F5977A2CC7}"/>
               </a:ext>
             </a:extLst>
           </p:cNvPr>
@@ -689,7 +689,7 @@
           <p:cNvPr id="4" name="Date Placeholder 3">
             <a:extLst>
               <a:ext uri="{FF2B5EF4-FFF2-40B4-BE49-F238E27FC236}">
-                <a16:creationId xmlns:a16="http://schemas.microsoft.com/office/drawing/2014/main" id="{E835F898-FB64-48E2-BD0A-B697E6B76C0E}"/>
+                <a16:creationId xmlns:a16="http://schemas.microsoft.com/office/drawing/2014/main" id="{58DDC236-95E3-402B-9312-FB33129401DD}"/>
               </a:ext>
             </a:extLst>
           </p:cNvPr>
@@ -705,7 +705,7 @@
           <a:bodyPr/>
           <a:lstStyle/>
           <a:p>
-            <a:fld id="{224D39E1-6AED-453D-B925-9F47B6C377E8}" type="datetimeFigureOut">
+            <a:fld id="{A59AA4C3-5966-49C4-8AB0-2217F3B62484}" type="datetimeFigureOut">
               <a:rPr lang="en-US" smtClean="0"/>
               <a:t>10/16/2020</a:t>
             </a:fld>
@@ -718,7 +718,7 @@
           <p:cNvPr id="5" name="Footer Placeholder 4">
             <a:extLst>
               <a:ext uri="{FF2B5EF4-FFF2-40B4-BE49-F238E27FC236}">
-                <a16:creationId xmlns:a16="http://schemas.microsoft.com/office/drawing/2014/main" id="{C9581578-7416-4542-958B-14A7DFF9013B}"/>
+                <a16:creationId xmlns:a16="http://schemas.microsoft.com/office/drawing/2014/main" id="{AEC5F392-7B21-4F13-895F-E3D8B19823B0}"/>
               </a:ext>
             </a:extLst>
           </p:cNvPr>
@@ -743,7 +743,7 @@
           <p:cNvPr id="6" name="Slide Number Placeholder 5">
             <a:extLst>
               <a:ext uri="{FF2B5EF4-FFF2-40B4-BE49-F238E27FC236}">
-                <a16:creationId xmlns:a16="http://schemas.microsoft.com/office/drawing/2014/main" id="{EE6CEC8B-26C8-4FC2-8344-4FC4F3193BEE}"/>
+                <a16:creationId xmlns:a16="http://schemas.microsoft.com/office/drawing/2014/main" id="{CD2B086C-27F6-44EA-A629-DC7273BD7D65}"/>
               </a:ext>
             </a:extLst>
           </p:cNvPr>
@@ -759,7 +759,7 @@
           <a:bodyPr/>
           <a:lstStyle/>
           <a:p>
-            <a:fld id="{F3F57941-03E2-4F0C-8D13-C45F58E78EC4}" type="slidenum">
+            <a:fld id="{0FDE0E09-EEF6-4B1B-84FD-88FC27233484}" type="slidenum">
               <a:rPr lang="en-US" smtClean="0"/>
               <a:t>‹#›</a:t>
             </a:fld>
@@ -770,7 +770,7 @@
     </p:spTree>
     <p:extLst>
       <p:ext uri="{BB962C8B-B14F-4D97-AF65-F5344CB8AC3E}">
-        <p14:creationId xmlns:p14="http://schemas.microsoft.com/office/powerpoint/2010/main" val="617569695"/>
+        <p14:creationId xmlns:p14="http://schemas.microsoft.com/office/powerpoint/2010/main" val="2150473218"/>
       </p:ext>
     </p:extLst>
   </p:cSld>
@@ -802,7 +802,7 @@
           <p:cNvPr id="2" name="Title 1">
             <a:extLst>
               <a:ext uri="{FF2B5EF4-FFF2-40B4-BE49-F238E27FC236}">
-                <a16:creationId xmlns:a16="http://schemas.microsoft.com/office/drawing/2014/main" id="{678FA57C-D6BF-4907-BC9F-2723E2CAE453}"/>
+                <a16:creationId xmlns:a16="http://schemas.microsoft.com/office/drawing/2014/main" id="{D807CE41-835B-4175-B766-82EBB445B92C}"/>
               </a:ext>
             </a:extLst>
           </p:cNvPr>
@@ -830,7 +830,7 @@
           <p:cNvPr id="3" name="Vertical Text Placeholder 2">
             <a:extLst>
               <a:ext uri="{FF2B5EF4-FFF2-40B4-BE49-F238E27FC236}">
-                <a16:creationId xmlns:a16="http://schemas.microsoft.com/office/drawing/2014/main" id="{E43C430F-BA08-4AB7-B4AE-557848C00AFC}"/>
+                <a16:creationId xmlns:a16="http://schemas.microsoft.com/office/drawing/2014/main" id="{E65A4160-28C7-4A64-A900-DBA0A95F42F3}"/>
               </a:ext>
             </a:extLst>
           </p:cNvPr>
@@ -887,7 +887,7 @@
           <p:cNvPr id="4" name="Date Placeholder 3">
             <a:extLst>
               <a:ext uri="{FF2B5EF4-FFF2-40B4-BE49-F238E27FC236}">
-                <a16:creationId xmlns:a16="http://schemas.microsoft.com/office/drawing/2014/main" id="{8C86416B-8467-4C26-A27D-59A80D673CA0}"/>
+                <a16:creationId xmlns:a16="http://schemas.microsoft.com/office/drawing/2014/main" id="{33E73620-B506-4B70-B7C3-54423503E984}"/>
               </a:ext>
             </a:extLst>
           </p:cNvPr>
@@ -903,7 +903,7 @@
           <a:bodyPr/>
           <a:lstStyle/>
           <a:p>
-            <a:fld id="{224D39E1-6AED-453D-B925-9F47B6C377E8}" type="datetimeFigureOut">
+            <a:fld id="{A59AA4C3-5966-49C4-8AB0-2217F3B62484}" type="datetimeFigureOut">
               <a:rPr lang="en-US" smtClean="0"/>
               <a:t>10/16/2020</a:t>
             </a:fld>
@@ -916,7 +916,7 @@
           <p:cNvPr id="5" name="Footer Placeholder 4">
             <a:extLst>
               <a:ext uri="{FF2B5EF4-FFF2-40B4-BE49-F238E27FC236}">
-                <a16:creationId xmlns:a16="http://schemas.microsoft.com/office/drawing/2014/main" id="{83390E2D-A0A9-4543-8F25-BE1FF9058CC6}"/>
+                <a16:creationId xmlns:a16="http://schemas.microsoft.com/office/drawing/2014/main" id="{2BCA3CCA-4CEB-4577-B1C5-7B494893DD5E}"/>
               </a:ext>
             </a:extLst>
           </p:cNvPr>
@@ -941,7 +941,7 @@
           <p:cNvPr id="6" name="Slide Number Placeholder 5">
             <a:extLst>
               <a:ext uri="{FF2B5EF4-FFF2-40B4-BE49-F238E27FC236}">
-                <a16:creationId xmlns:a16="http://schemas.microsoft.com/office/drawing/2014/main" id="{4BA6F746-8029-463E-AA65-AB627A9BE345}"/>
+                <a16:creationId xmlns:a16="http://schemas.microsoft.com/office/drawing/2014/main" id="{7EDA73AD-E629-4F0A-9E1E-C8D3AF997294}"/>
               </a:ext>
             </a:extLst>
           </p:cNvPr>
@@ -957,7 +957,7 @@
           <a:bodyPr/>
           <a:lstStyle/>
           <a:p>
-            <a:fld id="{F3F57941-03E2-4F0C-8D13-C45F58E78EC4}" type="slidenum">
+            <a:fld id="{0FDE0E09-EEF6-4B1B-84FD-88FC27233484}" type="slidenum">
               <a:rPr lang="en-US" smtClean="0"/>
               <a:t>‹#›</a:t>
             </a:fld>
@@ -968,7 +968,7 @@
     </p:spTree>
     <p:extLst>
       <p:ext uri="{BB962C8B-B14F-4D97-AF65-F5344CB8AC3E}">
-        <p14:creationId xmlns:p14="http://schemas.microsoft.com/office/powerpoint/2010/main" val="3501894989"/>
+        <p14:creationId xmlns:p14="http://schemas.microsoft.com/office/powerpoint/2010/main" val="27848927"/>
       </p:ext>
     </p:extLst>
   </p:cSld>
@@ -1000,7 +1000,7 @@
           <p:cNvPr id="2" name="Vertical Title 1">
             <a:extLst>
               <a:ext uri="{FF2B5EF4-FFF2-40B4-BE49-F238E27FC236}">
-                <a16:creationId xmlns:a16="http://schemas.microsoft.com/office/drawing/2014/main" id="{9BE41C46-CA79-47C3-BC06-98C95FF31486}"/>
+                <a16:creationId xmlns:a16="http://schemas.microsoft.com/office/drawing/2014/main" id="{929E30E3-DFB7-42A7-B481-98B7718E5174}"/>
               </a:ext>
             </a:extLst>
           </p:cNvPr>
@@ -1033,7 +1033,7 @@
           <p:cNvPr id="3" name="Vertical Text Placeholder 2">
             <a:extLst>
               <a:ext uri="{FF2B5EF4-FFF2-40B4-BE49-F238E27FC236}">
-                <a16:creationId xmlns:a16="http://schemas.microsoft.com/office/drawing/2014/main" id="{1DCEC1DF-D067-40A2-80E6-6752E90787BC}"/>
+                <a16:creationId xmlns:a16="http://schemas.microsoft.com/office/drawing/2014/main" id="{658DFDDF-0FA0-40F6-BAA4-60B276939117}"/>
               </a:ext>
             </a:extLst>
           </p:cNvPr>
@@ -1095,7 +1095,7 @@
           <p:cNvPr id="4" name="Date Placeholder 3">
             <a:extLst>
               <a:ext uri="{FF2B5EF4-FFF2-40B4-BE49-F238E27FC236}">
-                <a16:creationId xmlns:a16="http://schemas.microsoft.com/office/drawing/2014/main" id="{8B9948FE-D401-4908-9919-316629756BF3}"/>
+                <a16:creationId xmlns:a16="http://schemas.microsoft.com/office/drawing/2014/main" id="{D32C693F-68CB-42C9-A48C-E4DDD1618B08}"/>
               </a:ext>
             </a:extLst>
           </p:cNvPr>
@@ -1111,7 +1111,7 @@
           <a:bodyPr/>
           <a:lstStyle/>
           <a:p>
-            <a:fld id="{224D39E1-6AED-453D-B925-9F47B6C377E8}" type="datetimeFigureOut">
+            <a:fld id="{A59AA4C3-5966-49C4-8AB0-2217F3B62484}" type="datetimeFigureOut">
               <a:rPr lang="en-US" smtClean="0"/>
               <a:t>10/16/2020</a:t>
             </a:fld>
@@ -1124,7 +1124,7 @@
           <p:cNvPr id="5" name="Footer Placeholder 4">
             <a:extLst>
               <a:ext uri="{FF2B5EF4-FFF2-40B4-BE49-F238E27FC236}">
-                <a16:creationId xmlns:a16="http://schemas.microsoft.com/office/drawing/2014/main" id="{DDA5D06D-431C-4234-92B9-E7E0BE33F59B}"/>
+                <a16:creationId xmlns:a16="http://schemas.microsoft.com/office/drawing/2014/main" id="{C12C0AB6-62D7-4B5F-A8FC-14FF86A09A73}"/>
               </a:ext>
             </a:extLst>
           </p:cNvPr>
@@ -1149,7 +1149,7 @@
           <p:cNvPr id="6" name="Slide Number Placeholder 5">
             <a:extLst>
               <a:ext uri="{FF2B5EF4-FFF2-40B4-BE49-F238E27FC236}">
-                <a16:creationId xmlns:a16="http://schemas.microsoft.com/office/drawing/2014/main" id="{1EF14F0E-6236-4F4D-9A1B-8717933C02C2}"/>
+                <a16:creationId xmlns:a16="http://schemas.microsoft.com/office/drawing/2014/main" id="{B98E1F8B-90F4-43ED-A140-6EE4C9BBA964}"/>
               </a:ext>
             </a:extLst>
           </p:cNvPr>
@@ -1165,7 +1165,7 @@
           <a:bodyPr/>
           <a:lstStyle/>
           <a:p>
-            <a:fld id="{F3F57941-03E2-4F0C-8D13-C45F58E78EC4}" type="slidenum">
+            <a:fld id="{0FDE0E09-EEF6-4B1B-84FD-88FC27233484}" type="slidenum">
               <a:rPr lang="en-US" smtClean="0"/>
               <a:t>‹#›</a:t>
             </a:fld>
@@ -1176,7 +1176,7 @@
     </p:spTree>
     <p:extLst>
       <p:ext uri="{BB962C8B-B14F-4D97-AF65-F5344CB8AC3E}">
-        <p14:creationId xmlns:p14="http://schemas.microsoft.com/office/powerpoint/2010/main" val="3330262787"/>
+        <p14:creationId xmlns:p14="http://schemas.microsoft.com/office/powerpoint/2010/main" val="2937390064"/>
       </p:ext>
     </p:extLst>
   </p:cSld>
@@ -1208,7 +1208,7 @@
           <p:cNvPr id="2" name="Title 1">
             <a:extLst>
               <a:ext uri="{FF2B5EF4-FFF2-40B4-BE49-F238E27FC236}">
-                <a16:creationId xmlns:a16="http://schemas.microsoft.com/office/drawing/2014/main" id="{57BFF432-B8D5-47B6-946F-3D744F9B7C93}"/>
+                <a16:creationId xmlns:a16="http://schemas.microsoft.com/office/drawing/2014/main" id="{69E3900E-EB9E-43FC-AF7D-78D6A012183F}"/>
               </a:ext>
             </a:extLst>
           </p:cNvPr>
@@ -1236,7 +1236,7 @@
           <p:cNvPr id="3" name="Content Placeholder 2">
             <a:extLst>
               <a:ext uri="{FF2B5EF4-FFF2-40B4-BE49-F238E27FC236}">
-                <a16:creationId xmlns:a16="http://schemas.microsoft.com/office/drawing/2014/main" id="{242A6E90-EA44-4660-8A54-86B528D54E4E}"/>
+                <a16:creationId xmlns:a16="http://schemas.microsoft.com/office/drawing/2014/main" id="{209DFF90-40C5-4724-BA2A-37D945B29412}"/>
               </a:ext>
             </a:extLst>
           </p:cNvPr>
@@ -1293,7 +1293,7 @@
           <p:cNvPr id="4" name="Date Placeholder 3">
             <a:extLst>
               <a:ext uri="{FF2B5EF4-FFF2-40B4-BE49-F238E27FC236}">
-                <a16:creationId xmlns:a16="http://schemas.microsoft.com/office/drawing/2014/main" id="{A2B963BD-3967-4474-BB52-C4689A671E84}"/>
+                <a16:creationId xmlns:a16="http://schemas.microsoft.com/office/drawing/2014/main" id="{6EA49C9D-EB21-485F-B05E-D6D53B35004D}"/>
               </a:ext>
             </a:extLst>
           </p:cNvPr>
@@ -1309,7 +1309,7 @@
           <a:bodyPr/>
           <a:lstStyle/>
           <a:p>
-            <a:fld id="{224D39E1-6AED-453D-B925-9F47B6C377E8}" type="datetimeFigureOut">
+            <a:fld id="{A59AA4C3-5966-49C4-8AB0-2217F3B62484}" type="datetimeFigureOut">
               <a:rPr lang="en-US" smtClean="0"/>
               <a:t>10/16/2020</a:t>
             </a:fld>
@@ -1322,7 +1322,7 @@
           <p:cNvPr id="5" name="Footer Placeholder 4">
             <a:extLst>
               <a:ext uri="{FF2B5EF4-FFF2-40B4-BE49-F238E27FC236}">
-                <a16:creationId xmlns:a16="http://schemas.microsoft.com/office/drawing/2014/main" id="{06B8913B-E759-46A8-A103-1422A3CB6A0A}"/>
+                <a16:creationId xmlns:a16="http://schemas.microsoft.com/office/drawing/2014/main" id="{953A55E3-E437-410A-BB20-4F7B25D0BDB7}"/>
               </a:ext>
             </a:extLst>
           </p:cNvPr>
@@ -1347,7 +1347,7 @@
           <p:cNvPr id="6" name="Slide Number Placeholder 5">
             <a:extLst>
               <a:ext uri="{FF2B5EF4-FFF2-40B4-BE49-F238E27FC236}">
-                <a16:creationId xmlns:a16="http://schemas.microsoft.com/office/drawing/2014/main" id="{94CCBC8C-0E02-494A-B68D-2474CCE8307F}"/>
+                <a16:creationId xmlns:a16="http://schemas.microsoft.com/office/drawing/2014/main" id="{179477A7-9255-481D-9969-DF6057E2D03D}"/>
               </a:ext>
             </a:extLst>
           </p:cNvPr>
@@ -1363,7 +1363,7 @@
           <a:bodyPr/>
           <a:lstStyle/>
           <a:p>
-            <a:fld id="{F3F57941-03E2-4F0C-8D13-C45F58E78EC4}" type="slidenum">
+            <a:fld id="{0FDE0E09-EEF6-4B1B-84FD-88FC27233484}" type="slidenum">
               <a:rPr lang="en-US" smtClean="0"/>
               <a:t>‹#›</a:t>
             </a:fld>
@@ -1374,7 +1374,7 @@
     </p:spTree>
     <p:extLst>
       <p:ext uri="{BB962C8B-B14F-4D97-AF65-F5344CB8AC3E}">
-        <p14:creationId xmlns:p14="http://schemas.microsoft.com/office/powerpoint/2010/main" val="2239956889"/>
+        <p14:creationId xmlns:p14="http://schemas.microsoft.com/office/powerpoint/2010/main" val="541383480"/>
       </p:ext>
     </p:extLst>
   </p:cSld>
@@ -1406,7 +1406,7 @@
           <p:cNvPr id="2" name="Title 1">
             <a:extLst>
               <a:ext uri="{FF2B5EF4-FFF2-40B4-BE49-F238E27FC236}">
-                <a16:creationId xmlns:a16="http://schemas.microsoft.com/office/drawing/2014/main" id="{8AE00F11-E3A1-4E23-9D5A-C75EAC5BF156}"/>
+                <a16:creationId xmlns:a16="http://schemas.microsoft.com/office/drawing/2014/main" id="{61E7D7C7-F3AE-49C8-B857-CBF0AB16FB05}"/>
               </a:ext>
             </a:extLst>
           </p:cNvPr>
@@ -1443,7 +1443,7 @@
           <p:cNvPr id="3" name="Text Placeholder 2">
             <a:extLst>
               <a:ext uri="{FF2B5EF4-FFF2-40B4-BE49-F238E27FC236}">
-                <a16:creationId xmlns:a16="http://schemas.microsoft.com/office/drawing/2014/main" id="{497DF4C0-3309-4240-865C-2A2E50600BDC}"/>
+                <a16:creationId xmlns:a16="http://schemas.microsoft.com/office/drawing/2014/main" id="{D0673331-8325-45C0-8B34-DDCBBC20156D}"/>
               </a:ext>
             </a:extLst>
           </p:cNvPr>
@@ -1568,7 +1568,7 @@
           <p:cNvPr id="4" name="Date Placeholder 3">
             <a:extLst>
               <a:ext uri="{FF2B5EF4-FFF2-40B4-BE49-F238E27FC236}">
-                <a16:creationId xmlns:a16="http://schemas.microsoft.com/office/drawing/2014/main" id="{DD099E67-8FC1-44C6-8CAB-479ECF18D8FB}"/>
+                <a16:creationId xmlns:a16="http://schemas.microsoft.com/office/drawing/2014/main" id="{92F664AA-225D-44E6-8552-BB453F69297E}"/>
               </a:ext>
             </a:extLst>
           </p:cNvPr>
@@ -1584,7 +1584,7 @@
           <a:bodyPr/>
           <a:lstStyle/>
           <a:p>
-            <a:fld id="{224D39E1-6AED-453D-B925-9F47B6C377E8}" type="datetimeFigureOut">
+            <a:fld id="{A59AA4C3-5966-49C4-8AB0-2217F3B62484}" type="datetimeFigureOut">
               <a:rPr lang="en-US" smtClean="0"/>
               <a:t>10/16/2020</a:t>
             </a:fld>
@@ -1597,7 +1597,7 @@
           <p:cNvPr id="5" name="Footer Placeholder 4">
             <a:extLst>
               <a:ext uri="{FF2B5EF4-FFF2-40B4-BE49-F238E27FC236}">
-                <a16:creationId xmlns:a16="http://schemas.microsoft.com/office/drawing/2014/main" id="{EC784CA5-128D-4333-ADC7-2D34C1C26D69}"/>
+                <a16:creationId xmlns:a16="http://schemas.microsoft.com/office/drawing/2014/main" id="{872944DF-3E55-475A-8B8E-C79066468428}"/>
               </a:ext>
             </a:extLst>
           </p:cNvPr>
@@ -1622,7 +1622,7 @@
           <p:cNvPr id="6" name="Slide Number Placeholder 5">
             <a:extLst>
               <a:ext uri="{FF2B5EF4-FFF2-40B4-BE49-F238E27FC236}">
-                <a16:creationId xmlns:a16="http://schemas.microsoft.com/office/drawing/2014/main" id="{B0FFCA17-D188-4745-AA96-A6BDF99D06E5}"/>
+                <a16:creationId xmlns:a16="http://schemas.microsoft.com/office/drawing/2014/main" id="{B4A27B9C-1722-4137-B050-9D6FF2654DA8}"/>
               </a:ext>
             </a:extLst>
           </p:cNvPr>
@@ -1638,7 +1638,7 @@
           <a:bodyPr/>
           <a:lstStyle/>
           <a:p>
-            <a:fld id="{F3F57941-03E2-4F0C-8D13-C45F58E78EC4}" type="slidenum">
+            <a:fld id="{0FDE0E09-EEF6-4B1B-84FD-88FC27233484}" type="slidenum">
               <a:rPr lang="en-US" smtClean="0"/>
               <a:t>‹#›</a:t>
             </a:fld>
@@ -1649,7 +1649,7 @@
     </p:spTree>
     <p:extLst>
       <p:ext uri="{BB962C8B-B14F-4D97-AF65-F5344CB8AC3E}">
-        <p14:creationId xmlns:p14="http://schemas.microsoft.com/office/powerpoint/2010/main" val="665221251"/>
+        <p14:creationId xmlns:p14="http://schemas.microsoft.com/office/powerpoint/2010/main" val="2481440951"/>
       </p:ext>
     </p:extLst>
   </p:cSld>
@@ -1681,7 +1681,7 @@
           <p:cNvPr id="2" name="Title 1">
             <a:extLst>
               <a:ext uri="{FF2B5EF4-FFF2-40B4-BE49-F238E27FC236}">
-                <a16:creationId xmlns:a16="http://schemas.microsoft.com/office/drawing/2014/main" id="{A2046BCF-5F96-4022-93D1-AF01AEE8654E}"/>
+                <a16:creationId xmlns:a16="http://schemas.microsoft.com/office/drawing/2014/main" id="{F2EF6CAA-20F2-45A0-8B5C-461EBB5A68A3}"/>
               </a:ext>
             </a:extLst>
           </p:cNvPr>
@@ -1709,7 +1709,7 @@
           <p:cNvPr id="3" name="Content Placeholder 2">
             <a:extLst>
               <a:ext uri="{FF2B5EF4-FFF2-40B4-BE49-F238E27FC236}">
-                <a16:creationId xmlns:a16="http://schemas.microsoft.com/office/drawing/2014/main" id="{2238FFF6-723D-410D-9BEE-0AA49AF1D84D}"/>
+                <a16:creationId xmlns:a16="http://schemas.microsoft.com/office/drawing/2014/main" id="{58576626-48E3-4438-AF50-8D2DCAF1B8FC}"/>
               </a:ext>
             </a:extLst>
           </p:cNvPr>
@@ -1771,7 +1771,7 @@
           <p:cNvPr id="4" name="Content Placeholder 3">
             <a:extLst>
               <a:ext uri="{FF2B5EF4-FFF2-40B4-BE49-F238E27FC236}">
-                <a16:creationId xmlns:a16="http://schemas.microsoft.com/office/drawing/2014/main" id="{2F94C895-3461-46FA-8330-25D9BB305D8C}"/>
+                <a16:creationId xmlns:a16="http://schemas.microsoft.com/office/drawing/2014/main" id="{D629FC37-84D7-4DCB-9899-FF4A4F539A08}"/>
               </a:ext>
             </a:extLst>
           </p:cNvPr>
@@ -1833,7 +1833,7 @@
           <p:cNvPr id="5" name="Date Placeholder 4">
             <a:extLst>
               <a:ext uri="{FF2B5EF4-FFF2-40B4-BE49-F238E27FC236}">
-                <a16:creationId xmlns:a16="http://schemas.microsoft.com/office/drawing/2014/main" id="{1A47DAB4-88C4-4650-9DBB-A1095C1D43F0}"/>
+                <a16:creationId xmlns:a16="http://schemas.microsoft.com/office/drawing/2014/main" id="{464ACB17-9B37-43AF-9AB3-32335BF1D47E}"/>
               </a:ext>
             </a:extLst>
           </p:cNvPr>
@@ -1849,7 +1849,7 @@
           <a:bodyPr/>
           <a:lstStyle/>
           <a:p>
-            <a:fld id="{224D39E1-6AED-453D-B925-9F47B6C377E8}" type="datetimeFigureOut">
+            <a:fld id="{A59AA4C3-5966-49C4-8AB0-2217F3B62484}" type="datetimeFigureOut">
               <a:rPr lang="en-US" smtClean="0"/>
               <a:t>10/16/2020</a:t>
             </a:fld>
@@ -1862,7 +1862,7 @@
           <p:cNvPr id="6" name="Footer Placeholder 5">
             <a:extLst>
               <a:ext uri="{FF2B5EF4-FFF2-40B4-BE49-F238E27FC236}">
-                <a16:creationId xmlns:a16="http://schemas.microsoft.com/office/drawing/2014/main" id="{0D43ED34-E652-489D-8035-DE0AF8ED1B4C}"/>
+                <a16:creationId xmlns:a16="http://schemas.microsoft.com/office/drawing/2014/main" id="{9FD10180-02BB-478B-B286-D55E71E2E918}"/>
               </a:ext>
             </a:extLst>
           </p:cNvPr>
@@ -1887,7 +1887,7 @@
           <p:cNvPr id="7" name="Slide Number Placeholder 6">
             <a:extLst>
               <a:ext uri="{FF2B5EF4-FFF2-40B4-BE49-F238E27FC236}">
-                <a16:creationId xmlns:a16="http://schemas.microsoft.com/office/drawing/2014/main" id="{98FA3E74-DA16-4A1F-9536-4403EC229D3A}"/>
+                <a16:creationId xmlns:a16="http://schemas.microsoft.com/office/drawing/2014/main" id="{0E278793-D467-4195-A45E-84B793A852A8}"/>
               </a:ext>
             </a:extLst>
           </p:cNvPr>
@@ -1903,7 +1903,7 @@
           <a:bodyPr/>
           <a:lstStyle/>
           <a:p>
-            <a:fld id="{F3F57941-03E2-4F0C-8D13-C45F58E78EC4}" type="slidenum">
+            <a:fld id="{0FDE0E09-EEF6-4B1B-84FD-88FC27233484}" type="slidenum">
               <a:rPr lang="en-US" smtClean="0"/>
               <a:t>‹#›</a:t>
             </a:fld>
@@ -1914,7 +1914,7 @@
     </p:spTree>
     <p:extLst>
       <p:ext uri="{BB962C8B-B14F-4D97-AF65-F5344CB8AC3E}">
-        <p14:creationId xmlns:p14="http://schemas.microsoft.com/office/powerpoint/2010/main" val="3330304042"/>
+        <p14:creationId xmlns:p14="http://schemas.microsoft.com/office/powerpoint/2010/main" val="1638904816"/>
       </p:ext>
     </p:extLst>
   </p:cSld>
@@ -1946,7 +1946,7 @@
           <p:cNvPr id="2" name="Title 1">
             <a:extLst>
               <a:ext uri="{FF2B5EF4-FFF2-40B4-BE49-F238E27FC236}">
-                <a16:creationId xmlns:a16="http://schemas.microsoft.com/office/drawing/2014/main" id="{EC01509A-C23D-433D-AA6B-D5D4D20D44CA}"/>
+                <a16:creationId xmlns:a16="http://schemas.microsoft.com/office/drawing/2014/main" id="{407BEF64-1432-44B0-81A8-0FA05ED44D13}"/>
               </a:ext>
             </a:extLst>
           </p:cNvPr>
@@ -1979,7 +1979,7 @@
           <p:cNvPr id="3" name="Text Placeholder 2">
             <a:extLst>
               <a:ext uri="{FF2B5EF4-FFF2-40B4-BE49-F238E27FC236}">
-                <a16:creationId xmlns:a16="http://schemas.microsoft.com/office/drawing/2014/main" id="{8DFD2BF2-B4BB-4C87-99E2-A500D148B29B}"/>
+                <a16:creationId xmlns:a16="http://schemas.microsoft.com/office/drawing/2014/main" id="{F8F7E20C-F528-44B7-8B57-CFDAB80A7629}"/>
               </a:ext>
             </a:extLst>
           </p:cNvPr>
@@ -2050,7 +2050,7 @@
           <p:cNvPr id="4" name="Content Placeholder 3">
             <a:extLst>
               <a:ext uri="{FF2B5EF4-FFF2-40B4-BE49-F238E27FC236}">
-                <a16:creationId xmlns:a16="http://schemas.microsoft.com/office/drawing/2014/main" id="{5F878B96-3F08-4765-B25D-5F9FBE136478}"/>
+                <a16:creationId xmlns:a16="http://schemas.microsoft.com/office/drawing/2014/main" id="{3024DDE2-B478-4C6C-81D6-95D574038E95}"/>
               </a:ext>
             </a:extLst>
           </p:cNvPr>
@@ -2112,7 +2112,7 @@
           <p:cNvPr id="5" name="Text Placeholder 4">
             <a:extLst>
               <a:ext uri="{FF2B5EF4-FFF2-40B4-BE49-F238E27FC236}">
-                <a16:creationId xmlns:a16="http://schemas.microsoft.com/office/drawing/2014/main" id="{0475686A-B111-4618-A985-E559370B4C6C}"/>
+                <a16:creationId xmlns:a16="http://schemas.microsoft.com/office/drawing/2014/main" id="{99F84AA0-950A-4A5F-94E7-957715EBE532}"/>
               </a:ext>
             </a:extLst>
           </p:cNvPr>
@@ -2183,7 +2183,7 @@
           <p:cNvPr id="6" name="Content Placeholder 5">
             <a:extLst>
               <a:ext uri="{FF2B5EF4-FFF2-40B4-BE49-F238E27FC236}">
-                <a16:creationId xmlns:a16="http://schemas.microsoft.com/office/drawing/2014/main" id="{E6CE2776-9873-4A91-BAC3-6B35E3AC5A4C}"/>
+                <a16:creationId xmlns:a16="http://schemas.microsoft.com/office/drawing/2014/main" id="{A329BFDC-178B-4B6D-A65E-C5C54DA3F949}"/>
               </a:ext>
             </a:extLst>
           </p:cNvPr>
@@ -2245,7 +2245,7 @@
           <p:cNvPr id="7" name="Date Placeholder 6">
             <a:extLst>
               <a:ext uri="{FF2B5EF4-FFF2-40B4-BE49-F238E27FC236}">
-                <a16:creationId xmlns:a16="http://schemas.microsoft.com/office/drawing/2014/main" id="{0CC61031-1916-43AD-AA62-1FDB6091E5E6}"/>
+                <a16:creationId xmlns:a16="http://schemas.microsoft.com/office/drawing/2014/main" id="{DC3C3AF4-A542-4B89-AAB4-2C8B23549585}"/>
               </a:ext>
             </a:extLst>
           </p:cNvPr>
@@ -2261,7 +2261,7 @@
           <a:bodyPr/>
           <a:lstStyle/>
           <a:p>
-            <a:fld id="{224D39E1-6AED-453D-B925-9F47B6C377E8}" type="datetimeFigureOut">
+            <a:fld id="{A59AA4C3-5966-49C4-8AB0-2217F3B62484}" type="datetimeFigureOut">
               <a:rPr lang="en-US" smtClean="0"/>
               <a:t>10/16/2020</a:t>
             </a:fld>
@@ -2274,7 +2274,7 @@
           <p:cNvPr id="8" name="Footer Placeholder 7">
             <a:extLst>
               <a:ext uri="{FF2B5EF4-FFF2-40B4-BE49-F238E27FC236}">
-                <a16:creationId xmlns:a16="http://schemas.microsoft.com/office/drawing/2014/main" id="{6C0F7A6D-D952-4593-B1D1-0B34346FF303}"/>
+                <a16:creationId xmlns:a16="http://schemas.microsoft.com/office/drawing/2014/main" id="{FFA34338-3228-4706-A4F4-4C6B4D116CE3}"/>
               </a:ext>
             </a:extLst>
           </p:cNvPr>
@@ -2299,7 +2299,7 @@
           <p:cNvPr id="9" name="Slide Number Placeholder 8">
             <a:extLst>
               <a:ext uri="{FF2B5EF4-FFF2-40B4-BE49-F238E27FC236}">
-                <a16:creationId xmlns:a16="http://schemas.microsoft.com/office/drawing/2014/main" id="{ABA7A600-FE82-44C8-8F7C-E31CCAF0E4DE}"/>
+                <a16:creationId xmlns:a16="http://schemas.microsoft.com/office/drawing/2014/main" id="{51A997A0-41B6-4765-A393-7C85AD25B879}"/>
               </a:ext>
             </a:extLst>
           </p:cNvPr>
@@ -2315,7 +2315,7 @@
           <a:bodyPr/>
           <a:lstStyle/>
           <a:p>
-            <a:fld id="{F3F57941-03E2-4F0C-8D13-C45F58E78EC4}" type="slidenum">
+            <a:fld id="{0FDE0E09-EEF6-4B1B-84FD-88FC27233484}" type="slidenum">
               <a:rPr lang="en-US" smtClean="0"/>
               <a:t>‹#›</a:t>
             </a:fld>
@@ -2326,7 +2326,7 @@
     </p:spTree>
     <p:extLst>
       <p:ext uri="{BB962C8B-B14F-4D97-AF65-F5344CB8AC3E}">
-        <p14:creationId xmlns:p14="http://schemas.microsoft.com/office/powerpoint/2010/main" val="3811264268"/>
+        <p14:creationId xmlns:p14="http://schemas.microsoft.com/office/powerpoint/2010/main" val="3314909584"/>
       </p:ext>
     </p:extLst>
   </p:cSld>
@@ -2358,7 +2358,7 @@
           <p:cNvPr id="2" name="Title 1">
             <a:extLst>
               <a:ext uri="{FF2B5EF4-FFF2-40B4-BE49-F238E27FC236}">
-                <a16:creationId xmlns:a16="http://schemas.microsoft.com/office/drawing/2014/main" id="{DE808A62-EB10-4AFF-94E1-4F276478A64E}"/>
+                <a16:creationId xmlns:a16="http://schemas.microsoft.com/office/drawing/2014/main" id="{D2BDD010-1268-45B8-A733-86CF1F6EAAED}"/>
               </a:ext>
             </a:extLst>
           </p:cNvPr>
@@ -2386,7 +2386,7 @@
           <p:cNvPr id="3" name="Date Placeholder 2">
             <a:extLst>
               <a:ext uri="{FF2B5EF4-FFF2-40B4-BE49-F238E27FC236}">
-                <a16:creationId xmlns:a16="http://schemas.microsoft.com/office/drawing/2014/main" id="{1DBD298A-78FC-4F16-9818-432A81A7489B}"/>
+                <a16:creationId xmlns:a16="http://schemas.microsoft.com/office/drawing/2014/main" id="{1BBA91D3-FC8B-4BF2-A25E-6FCBCE2624CA}"/>
               </a:ext>
             </a:extLst>
           </p:cNvPr>
@@ -2402,7 +2402,7 @@
           <a:bodyPr/>
           <a:lstStyle/>
           <a:p>
-            <a:fld id="{224D39E1-6AED-453D-B925-9F47B6C377E8}" type="datetimeFigureOut">
+            <a:fld id="{A59AA4C3-5966-49C4-8AB0-2217F3B62484}" type="datetimeFigureOut">
               <a:rPr lang="en-US" smtClean="0"/>
               <a:t>10/16/2020</a:t>
             </a:fld>
@@ -2415,7 +2415,7 @@
           <p:cNvPr id="4" name="Footer Placeholder 3">
             <a:extLst>
               <a:ext uri="{FF2B5EF4-FFF2-40B4-BE49-F238E27FC236}">
-                <a16:creationId xmlns:a16="http://schemas.microsoft.com/office/drawing/2014/main" id="{45DB4653-FFF6-4741-8BB1-399D280B282D}"/>
+                <a16:creationId xmlns:a16="http://schemas.microsoft.com/office/drawing/2014/main" id="{C4DC8B85-602F-4F73-892D-B8C91E8FBF19}"/>
               </a:ext>
             </a:extLst>
           </p:cNvPr>
@@ -2440,7 +2440,7 @@
           <p:cNvPr id="5" name="Slide Number Placeholder 4">
             <a:extLst>
               <a:ext uri="{FF2B5EF4-FFF2-40B4-BE49-F238E27FC236}">
-                <a16:creationId xmlns:a16="http://schemas.microsoft.com/office/drawing/2014/main" id="{3DB40CC1-62CB-4F23-B17C-7FD89499F6FB}"/>
+                <a16:creationId xmlns:a16="http://schemas.microsoft.com/office/drawing/2014/main" id="{5B6E3BB3-20B0-4B79-8B98-395F2789978A}"/>
               </a:ext>
             </a:extLst>
           </p:cNvPr>
@@ -2456,7 +2456,7 @@
           <a:bodyPr/>
           <a:lstStyle/>
           <a:p>
-            <a:fld id="{F3F57941-03E2-4F0C-8D13-C45F58E78EC4}" type="slidenum">
+            <a:fld id="{0FDE0E09-EEF6-4B1B-84FD-88FC27233484}" type="slidenum">
               <a:rPr lang="en-US" smtClean="0"/>
               <a:t>‹#›</a:t>
             </a:fld>
@@ -2467,7 +2467,7 @@
     </p:spTree>
     <p:extLst>
       <p:ext uri="{BB962C8B-B14F-4D97-AF65-F5344CB8AC3E}">
-        <p14:creationId xmlns:p14="http://schemas.microsoft.com/office/powerpoint/2010/main" val="589709494"/>
+        <p14:creationId xmlns:p14="http://schemas.microsoft.com/office/powerpoint/2010/main" val="118276100"/>
       </p:ext>
     </p:extLst>
   </p:cSld>
@@ -2499,7 +2499,7 @@
           <p:cNvPr id="2" name="Date Placeholder 1">
             <a:extLst>
               <a:ext uri="{FF2B5EF4-FFF2-40B4-BE49-F238E27FC236}">
-                <a16:creationId xmlns:a16="http://schemas.microsoft.com/office/drawing/2014/main" id="{D681586C-67FB-4D9D-8323-781B2A578B10}"/>
+                <a16:creationId xmlns:a16="http://schemas.microsoft.com/office/drawing/2014/main" id="{76E79E17-468A-49BD-B09A-6A5AAAFC067F}"/>
               </a:ext>
             </a:extLst>
           </p:cNvPr>
@@ -2515,7 +2515,7 @@
           <a:bodyPr/>
           <a:lstStyle/>
           <a:p>
-            <a:fld id="{224D39E1-6AED-453D-B925-9F47B6C377E8}" type="datetimeFigureOut">
+            <a:fld id="{A59AA4C3-5966-49C4-8AB0-2217F3B62484}" type="datetimeFigureOut">
               <a:rPr lang="en-US" smtClean="0"/>
               <a:t>10/16/2020</a:t>
             </a:fld>
@@ -2528,7 +2528,7 @@
           <p:cNvPr id="3" name="Footer Placeholder 2">
             <a:extLst>
               <a:ext uri="{FF2B5EF4-FFF2-40B4-BE49-F238E27FC236}">
-                <a16:creationId xmlns:a16="http://schemas.microsoft.com/office/drawing/2014/main" id="{FF42416E-32CE-464C-8935-B52987FD9DDA}"/>
+                <a16:creationId xmlns:a16="http://schemas.microsoft.com/office/drawing/2014/main" id="{6C6A167B-0102-4AAA-B3A8-99706A36DA52}"/>
               </a:ext>
             </a:extLst>
           </p:cNvPr>
@@ -2553,7 +2553,7 @@
           <p:cNvPr id="4" name="Slide Number Placeholder 3">
             <a:extLst>
               <a:ext uri="{FF2B5EF4-FFF2-40B4-BE49-F238E27FC236}">
-                <a16:creationId xmlns:a16="http://schemas.microsoft.com/office/drawing/2014/main" id="{BB15D908-446A-44AD-B9E2-D108E04F5F86}"/>
+                <a16:creationId xmlns:a16="http://schemas.microsoft.com/office/drawing/2014/main" id="{3477B65D-4210-480D-8132-0C49A419AE59}"/>
               </a:ext>
             </a:extLst>
           </p:cNvPr>
@@ -2569,7 +2569,7 @@
           <a:bodyPr/>
           <a:lstStyle/>
           <a:p>
-            <a:fld id="{F3F57941-03E2-4F0C-8D13-C45F58E78EC4}" type="slidenum">
+            <a:fld id="{0FDE0E09-EEF6-4B1B-84FD-88FC27233484}" type="slidenum">
               <a:rPr lang="en-US" smtClean="0"/>
               <a:t>‹#›</a:t>
             </a:fld>
@@ -2580,7 +2580,7 @@
     </p:spTree>
     <p:extLst>
       <p:ext uri="{BB962C8B-B14F-4D97-AF65-F5344CB8AC3E}">
-        <p14:creationId xmlns:p14="http://schemas.microsoft.com/office/powerpoint/2010/main" val="3542696080"/>
+        <p14:creationId xmlns:p14="http://schemas.microsoft.com/office/powerpoint/2010/main" val="1949633166"/>
       </p:ext>
     </p:extLst>
   </p:cSld>
@@ -2612,7 +2612,7 @@
           <p:cNvPr id="2" name="Title 1">
             <a:extLst>
               <a:ext uri="{FF2B5EF4-FFF2-40B4-BE49-F238E27FC236}">
-                <a16:creationId xmlns:a16="http://schemas.microsoft.com/office/drawing/2014/main" id="{13835D93-E493-4653-9009-90CC2767433E}"/>
+                <a16:creationId xmlns:a16="http://schemas.microsoft.com/office/drawing/2014/main" id="{A66E034A-3DDA-4DD5-B146-A73AA8D332B6}"/>
               </a:ext>
             </a:extLst>
           </p:cNvPr>
@@ -2649,7 +2649,7 @@
           <p:cNvPr id="3" name="Content Placeholder 2">
             <a:extLst>
               <a:ext uri="{FF2B5EF4-FFF2-40B4-BE49-F238E27FC236}">
-                <a16:creationId xmlns:a16="http://schemas.microsoft.com/office/drawing/2014/main" id="{4B373177-7D23-4C2D-84FA-40CA558CA0BB}"/>
+                <a16:creationId xmlns:a16="http://schemas.microsoft.com/office/drawing/2014/main" id="{4FA890C9-BDC4-4BA0-8322-676D30915AC0}"/>
               </a:ext>
             </a:extLst>
           </p:cNvPr>
@@ -2739,7 +2739,7 @@
           <p:cNvPr id="4" name="Text Placeholder 3">
             <a:extLst>
               <a:ext uri="{FF2B5EF4-FFF2-40B4-BE49-F238E27FC236}">
-                <a16:creationId xmlns:a16="http://schemas.microsoft.com/office/drawing/2014/main" id="{3D3FB8A0-6428-4055-B756-1B3F5E140465}"/>
+                <a16:creationId xmlns:a16="http://schemas.microsoft.com/office/drawing/2014/main" id="{DEA10F3A-06F7-4E27-B0BC-0D973231C65E}"/>
               </a:ext>
             </a:extLst>
           </p:cNvPr>
@@ -2810,7 +2810,7 @@
           <p:cNvPr id="5" name="Date Placeholder 4">
             <a:extLst>
               <a:ext uri="{FF2B5EF4-FFF2-40B4-BE49-F238E27FC236}">
-                <a16:creationId xmlns:a16="http://schemas.microsoft.com/office/drawing/2014/main" id="{44EE28F0-03C4-4DE7-A41B-070FC005A2FD}"/>
+                <a16:creationId xmlns:a16="http://schemas.microsoft.com/office/drawing/2014/main" id="{E418F0FC-B298-4307-8E28-22FDDABB6C50}"/>
               </a:ext>
             </a:extLst>
           </p:cNvPr>
@@ -2826,7 +2826,7 @@
           <a:bodyPr/>
           <a:lstStyle/>
           <a:p>
-            <a:fld id="{224D39E1-6AED-453D-B925-9F47B6C377E8}" type="datetimeFigureOut">
+            <a:fld id="{A59AA4C3-5966-49C4-8AB0-2217F3B62484}" type="datetimeFigureOut">
               <a:rPr lang="en-US" smtClean="0"/>
               <a:t>10/16/2020</a:t>
             </a:fld>
@@ -2839,7 +2839,7 @@
           <p:cNvPr id="6" name="Footer Placeholder 5">
             <a:extLst>
               <a:ext uri="{FF2B5EF4-FFF2-40B4-BE49-F238E27FC236}">
-                <a16:creationId xmlns:a16="http://schemas.microsoft.com/office/drawing/2014/main" id="{AAB966F0-9312-422F-892B-EEB8154E5E60}"/>
+                <a16:creationId xmlns:a16="http://schemas.microsoft.com/office/drawing/2014/main" id="{FC5F0E8B-157F-407C-B9FC-D46057261C3D}"/>
               </a:ext>
             </a:extLst>
           </p:cNvPr>
@@ -2864,7 +2864,7 @@
           <p:cNvPr id="7" name="Slide Number Placeholder 6">
             <a:extLst>
               <a:ext uri="{FF2B5EF4-FFF2-40B4-BE49-F238E27FC236}">
-                <a16:creationId xmlns:a16="http://schemas.microsoft.com/office/drawing/2014/main" id="{DA12F360-4A83-4985-896C-C7CB528DF4F0}"/>
+                <a16:creationId xmlns:a16="http://schemas.microsoft.com/office/drawing/2014/main" id="{12920740-E83B-48B0-93AF-E265757E8A0F}"/>
               </a:ext>
             </a:extLst>
           </p:cNvPr>
@@ -2880,7 +2880,7 @@
           <a:bodyPr/>
           <a:lstStyle/>
           <a:p>
-            <a:fld id="{F3F57941-03E2-4F0C-8D13-C45F58E78EC4}" type="slidenum">
+            <a:fld id="{0FDE0E09-EEF6-4B1B-84FD-88FC27233484}" type="slidenum">
               <a:rPr lang="en-US" smtClean="0"/>
               <a:t>‹#›</a:t>
             </a:fld>
@@ -2891,7 +2891,7 @@
     </p:spTree>
     <p:extLst>
       <p:ext uri="{BB962C8B-B14F-4D97-AF65-F5344CB8AC3E}">
-        <p14:creationId xmlns:p14="http://schemas.microsoft.com/office/powerpoint/2010/main" val="28945673"/>
+        <p14:creationId xmlns:p14="http://schemas.microsoft.com/office/powerpoint/2010/main" val="1189025021"/>
       </p:ext>
     </p:extLst>
   </p:cSld>
@@ -2923,7 +2923,7 @@
           <p:cNvPr id="2" name="Title 1">
             <a:extLst>
               <a:ext uri="{FF2B5EF4-FFF2-40B4-BE49-F238E27FC236}">
-                <a16:creationId xmlns:a16="http://schemas.microsoft.com/office/drawing/2014/main" id="{472804EF-155D-4D9E-8F94-6A49FBF62D93}"/>
+                <a16:creationId xmlns:a16="http://schemas.microsoft.com/office/drawing/2014/main" id="{FC989774-94CB-4765-8A2B-B5FAD2039AFF}"/>
               </a:ext>
             </a:extLst>
           </p:cNvPr>
@@ -2960,7 +2960,7 @@
           <p:cNvPr id="3" name="Picture Placeholder 2">
             <a:extLst>
               <a:ext uri="{FF2B5EF4-FFF2-40B4-BE49-F238E27FC236}">
-                <a16:creationId xmlns:a16="http://schemas.microsoft.com/office/drawing/2014/main" id="{CDD6AC7B-251F-4690-B2A5-FA9A32C92703}"/>
+                <a16:creationId xmlns:a16="http://schemas.microsoft.com/office/drawing/2014/main" id="{D31F5F94-E582-4CAE-BE89-22E556FE1E77}"/>
               </a:ext>
             </a:extLst>
           </p:cNvPr>
@@ -3027,7 +3027,7 @@
           <p:cNvPr id="4" name="Text Placeholder 3">
             <a:extLst>
               <a:ext uri="{FF2B5EF4-FFF2-40B4-BE49-F238E27FC236}">
-                <a16:creationId xmlns:a16="http://schemas.microsoft.com/office/drawing/2014/main" id="{E76B3C55-1AF0-47F2-9B9E-6ECEC27185A7}"/>
+                <a16:creationId xmlns:a16="http://schemas.microsoft.com/office/drawing/2014/main" id="{98F4E7AE-21A0-46A4-A047-1084FBF07F3E}"/>
               </a:ext>
             </a:extLst>
           </p:cNvPr>
@@ -3098,7 +3098,7 @@
           <p:cNvPr id="5" name="Date Placeholder 4">
             <a:extLst>
               <a:ext uri="{FF2B5EF4-FFF2-40B4-BE49-F238E27FC236}">
-                <a16:creationId xmlns:a16="http://schemas.microsoft.com/office/drawing/2014/main" id="{02F3F9A0-0034-4FA4-A773-3A330FC6F02D}"/>
+                <a16:creationId xmlns:a16="http://schemas.microsoft.com/office/drawing/2014/main" id="{F91EE83E-1447-42B4-B5E7-C3381B56CFD7}"/>
               </a:ext>
             </a:extLst>
           </p:cNvPr>
@@ -3114,7 +3114,7 @@
           <a:bodyPr/>
           <a:lstStyle/>
           <a:p>
-            <a:fld id="{224D39E1-6AED-453D-B925-9F47B6C377E8}" type="datetimeFigureOut">
+            <a:fld id="{A59AA4C3-5966-49C4-8AB0-2217F3B62484}" type="datetimeFigureOut">
               <a:rPr lang="en-US" smtClean="0"/>
               <a:t>10/16/2020</a:t>
             </a:fld>
@@ -3127,7 +3127,7 @@
           <p:cNvPr id="6" name="Footer Placeholder 5">
             <a:extLst>
               <a:ext uri="{FF2B5EF4-FFF2-40B4-BE49-F238E27FC236}">
-                <a16:creationId xmlns:a16="http://schemas.microsoft.com/office/drawing/2014/main" id="{571450C8-A0CC-4B00-9296-C087F9A619D8}"/>
+                <a16:creationId xmlns:a16="http://schemas.microsoft.com/office/drawing/2014/main" id="{6BC1D937-E135-4F32-96D5-3E4B435B5C97}"/>
               </a:ext>
             </a:extLst>
           </p:cNvPr>
@@ -3152,7 +3152,7 @@
           <p:cNvPr id="7" name="Slide Number Placeholder 6">
             <a:extLst>
               <a:ext uri="{FF2B5EF4-FFF2-40B4-BE49-F238E27FC236}">
-                <a16:creationId xmlns:a16="http://schemas.microsoft.com/office/drawing/2014/main" id="{01F87954-1CD2-480C-82ED-A9D46FE50DB9}"/>
+                <a16:creationId xmlns:a16="http://schemas.microsoft.com/office/drawing/2014/main" id="{60217323-9B12-43FF-8841-C84253CC4F6F}"/>
               </a:ext>
             </a:extLst>
           </p:cNvPr>
@@ -3168,7 +3168,7 @@
           <a:bodyPr/>
           <a:lstStyle/>
           <a:p>
-            <a:fld id="{F3F57941-03E2-4F0C-8D13-C45F58E78EC4}" type="slidenum">
+            <a:fld id="{0FDE0E09-EEF6-4B1B-84FD-88FC27233484}" type="slidenum">
               <a:rPr lang="en-US" smtClean="0"/>
               <a:t>‹#›</a:t>
             </a:fld>
@@ -3179,7 +3179,7 @@
     </p:spTree>
     <p:extLst>
       <p:ext uri="{BB962C8B-B14F-4D97-AF65-F5344CB8AC3E}">
-        <p14:creationId xmlns:p14="http://schemas.microsoft.com/office/powerpoint/2010/main" val="3395184121"/>
+        <p14:creationId xmlns:p14="http://schemas.microsoft.com/office/powerpoint/2010/main" val="3021186819"/>
       </p:ext>
     </p:extLst>
   </p:cSld>
@@ -3216,7 +3216,7 @@
           <p:cNvPr id="2" name="Title Placeholder 1">
             <a:extLst>
               <a:ext uri="{FF2B5EF4-FFF2-40B4-BE49-F238E27FC236}">
-                <a16:creationId xmlns:a16="http://schemas.microsoft.com/office/drawing/2014/main" id="{492869DC-1A00-4203-8555-5479315BD00A}"/>
+                <a16:creationId xmlns:a16="http://schemas.microsoft.com/office/drawing/2014/main" id="{B74088F5-9684-4512-9421-D0E0AFCC6245}"/>
               </a:ext>
             </a:extLst>
           </p:cNvPr>
@@ -3254,7 +3254,7 @@
           <p:cNvPr id="3" name="Text Placeholder 2">
             <a:extLst>
               <a:ext uri="{FF2B5EF4-FFF2-40B4-BE49-F238E27FC236}">
-                <a16:creationId xmlns:a16="http://schemas.microsoft.com/office/drawing/2014/main" id="{D943A31F-EFAB-4B51-9511-05E0B7EAE6B2}"/>
+                <a16:creationId xmlns:a16="http://schemas.microsoft.com/office/drawing/2014/main" id="{0D9BAB20-639A-40F7-A1E3-6833CE5A91BF}"/>
               </a:ext>
             </a:extLst>
           </p:cNvPr>
@@ -3321,7 +3321,7 @@
           <p:cNvPr id="4" name="Date Placeholder 3">
             <a:extLst>
               <a:ext uri="{FF2B5EF4-FFF2-40B4-BE49-F238E27FC236}">
-                <a16:creationId xmlns:a16="http://schemas.microsoft.com/office/drawing/2014/main" id="{B8E2C495-A158-414E-91BA-35E9165DB351}"/>
+                <a16:creationId xmlns:a16="http://schemas.microsoft.com/office/drawing/2014/main" id="{C68473C3-88B0-4D39-9358-9F3A739DC311}"/>
               </a:ext>
             </a:extLst>
           </p:cNvPr>
@@ -3355,7 +3355,7 @@
             </a:lvl1pPr>
           </a:lstStyle>
           <a:p>
-            <a:fld id="{224D39E1-6AED-453D-B925-9F47B6C377E8}" type="datetimeFigureOut">
+            <a:fld id="{A59AA4C3-5966-49C4-8AB0-2217F3B62484}" type="datetimeFigureOut">
               <a:rPr lang="en-US" smtClean="0"/>
               <a:t>10/16/2020</a:t>
             </a:fld>
@@ -3368,7 +3368,7 @@
           <p:cNvPr id="5" name="Footer Placeholder 4">
             <a:extLst>
               <a:ext uri="{FF2B5EF4-FFF2-40B4-BE49-F238E27FC236}">
-                <a16:creationId xmlns:a16="http://schemas.microsoft.com/office/drawing/2014/main" id="{095C7998-C670-4BC3-9436-773AE7C3EB80}"/>
+                <a16:creationId xmlns:a16="http://schemas.microsoft.com/office/drawing/2014/main" id="{F1C6E053-6F28-4A14-95A1-22BF58F8B92F}"/>
               </a:ext>
             </a:extLst>
           </p:cNvPr>
@@ -3411,7 +3411,7 @@
           <p:cNvPr id="6" name="Slide Number Placeholder 5">
             <a:extLst>
               <a:ext uri="{FF2B5EF4-FFF2-40B4-BE49-F238E27FC236}">
-                <a16:creationId xmlns:a16="http://schemas.microsoft.com/office/drawing/2014/main" id="{CFA1D24A-DC6D-433B-A82B-9EDDE9BA3026}"/>
+                <a16:creationId xmlns:a16="http://schemas.microsoft.com/office/drawing/2014/main" id="{83F75179-F826-4847-B2F3-35AD3F4EF4DF}"/>
               </a:ext>
             </a:extLst>
           </p:cNvPr>
@@ -3445,7 +3445,7 @@
             </a:lvl1pPr>
           </a:lstStyle>
           <a:p>
-            <a:fld id="{F3F57941-03E2-4F0C-8D13-C45F58E78EC4}" type="slidenum">
+            <a:fld id="{0FDE0E09-EEF6-4B1B-84FD-88FC27233484}" type="slidenum">
               <a:rPr lang="en-US" smtClean="0"/>
               <a:t>‹#›</a:t>
             </a:fld>
@@ -3456,7 +3456,7 @@
     </p:spTree>
     <p:extLst>
       <p:ext uri="{BB962C8B-B14F-4D97-AF65-F5344CB8AC3E}">
-        <p14:creationId xmlns:p14="http://schemas.microsoft.com/office/powerpoint/2010/main" val="2661052302"/>
+        <p14:creationId xmlns:p14="http://schemas.microsoft.com/office/powerpoint/2010/main" val="1212459181"/>
       </p:ext>
     </p:extLst>
   </p:cSld>
@@ -3779,7 +3779,7 @@
           <p:cNvPr id="2" name="Title 1">
             <a:extLst>
               <a:ext uri="{FF2B5EF4-FFF2-40B4-BE49-F238E27FC236}">
-                <a16:creationId xmlns:a16="http://schemas.microsoft.com/office/drawing/2014/main" id="{D174F5B1-6FD3-4C2D-8811-2B7B9FD9348D}"/>
+                <a16:creationId xmlns:a16="http://schemas.microsoft.com/office/drawing/2014/main" id="{72E9E514-5D1C-4628-9181-F49FC69B0AC7}"/>
               </a:ext>
             </a:extLst>
           </p:cNvPr>
@@ -3811,7 +3811,7 @@
           <p:cNvPr id="3" name="Content Placeholder 2">
             <a:extLst>
               <a:ext uri="{FF2B5EF4-FFF2-40B4-BE49-F238E27FC236}">
-                <a16:creationId xmlns:a16="http://schemas.microsoft.com/office/drawing/2014/main" id="{C4E0F83F-0D68-4225-B35F-A87DFCF73150}"/>
+                <a16:creationId xmlns:a16="http://schemas.microsoft.com/office/drawing/2014/main" id="{F45AA8F7-BC5F-4AC9-9717-22C7607CAC55}"/>
               </a:ext>
             </a:extLst>
           </p:cNvPr>
@@ -3839,7 +3839,7 @@
           <p:cNvPr id="5" name="Picture 4">
             <a:extLst>
               <a:ext uri="{FF2B5EF4-FFF2-40B4-BE49-F238E27FC236}">
-                <a16:creationId xmlns:a16="http://schemas.microsoft.com/office/drawing/2014/main" id="{DEF1E869-5AC9-43EC-BCEB-6A60D3893C31}"/>
+                <a16:creationId xmlns:a16="http://schemas.microsoft.com/office/drawing/2014/main" id="{4AF256AD-01EF-49A9-B25C-D5228E530327}"/>
               </a:ext>
             </a:extLst>
           </p:cNvPr>
@@ -3863,7 +3863,79 @@
         <p:spPr>
           <a:xfrm>
             <a:off x="838200" y="1825625"/>
-            <a:ext cx="10515600" cy="4351338"/>
+            <a:ext cx="1778000" cy="1778000"/>
+          </a:xfrm>
+          <a:prstGeom prst="rect">
+            <a:avLst/>
+          </a:prstGeom>
+        </p:spPr>
+      </p:pic>
+      <p:pic>
+        <p:nvPicPr>
+          <p:cNvPr id="7" name="Picture 6">
+            <a:extLst>
+              <a:ext uri="{FF2B5EF4-FFF2-40B4-BE49-F238E27FC236}">
+                <a16:creationId xmlns:a16="http://schemas.microsoft.com/office/drawing/2014/main" id="{AC3595BE-1A29-4E0D-8F95-F369A8B81D19}"/>
+              </a:ext>
+            </a:extLst>
+          </p:cNvPr>
+          <p:cNvPicPr>
+            <a:picLocks/>
+          </p:cNvPicPr>
+          <p:nvPr/>
+        </p:nvPicPr>
+        <p:blipFill>
+          <a:blip r:embed="rId4">
+            <a:extLst>
+              <a:ext uri="{28A0092B-C50C-407E-A947-70E740481C1C}">
+                <a14:useLocalDpi xmlns:a14="http://schemas.microsoft.com/office/drawing/2010/main" val="0"/>
+              </a:ext>
+            </a:extLst>
+          </a:blip>
+          <a:stretch>
+            <a:fillRect/>
+          </a:stretch>
+        </p:blipFill>
+        <p:spPr>
+          <a:xfrm>
+            <a:off x="838200" y="1825625"/>
+            <a:ext cx="1778000" cy="1778000"/>
+          </a:xfrm>
+          <a:prstGeom prst="rect">
+            <a:avLst/>
+          </a:prstGeom>
+        </p:spPr>
+      </p:pic>
+      <p:pic>
+        <p:nvPicPr>
+          <p:cNvPr id="9" name="Picture 8">
+            <a:extLst>
+              <a:ext uri="{FF2B5EF4-FFF2-40B4-BE49-F238E27FC236}">
+                <a16:creationId xmlns:a16="http://schemas.microsoft.com/office/drawing/2014/main" id="{FBAAEB7B-DC9C-49ED-B8DF-F5E94B64AC47}"/>
+              </a:ext>
+            </a:extLst>
+          </p:cNvPr>
+          <p:cNvPicPr>
+            <a:picLocks/>
+          </p:cNvPicPr>
+          <p:nvPr/>
+        </p:nvPicPr>
+        <p:blipFill>
+          <a:blip r:embed="rId5">
+            <a:extLst>
+              <a:ext uri="{28A0092B-C50C-407E-A947-70E740481C1C}">
+                <a14:useLocalDpi xmlns:a14="http://schemas.microsoft.com/office/drawing/2010/main" val="0"/>
+              </a:ext>
+            </a:extLst>
+          </a:blip>
+          <a:stretch>
+            <a:fillRect/>
+          </a:stretch>
+        </p:blipFill>
+        <p:spPr>
+          <a:xfrm>
+            <a:off x="838200" y="1825625"/>
+            <a:ext cx="1778000" cy="1778000"/>
           </a:xfrm>
           <a:prstGeom prst="rect">
             <a:avLst/>
@@ -3873,7 +3945,7 @@
     </p:spTree>
     <p:extLst>
       <p:ext uri="{BB962C8B-B14F-4D97-AF65-F5344CB8AC3E}">
-        <p14:creationId xmlns:p14="http://schemas.microsoft.com/office/powerpoint/2010/main" val="710152848"/>
+        <p14:creationId xmlns:p14="http://schemas.microsoft.com/office/powerpoint/2010/main" val="2863083195"/>
       </p:ext>
     </p:extLst>
   </p:cSld>

</xml_diff>